<commit_message>
added ability to pass headers and qs options to address #17
</commit_message>
<xml_diff>
--- a/docs/oasgraph.pptx
+++ b/docs/oasgraph.pptx
@@ -5,14 +5,16 @@
     <p:sldMasterId id="2147483648" r:id="rId1"/>
   </p:sldMasterIdLst>
   <p:notesMasterIdLst>
-    <p:notesMasterId r:id="rId7"/>
+    <p:notesMasterId r:id="rId9"/>
   </p:notesMasterIdLst>
   <p:sldIdLst>
     <p:sldId id="256" r:id="rId2"/>
     <p:sldId id="257" r:id="rId3"/>
     <p:sldId id="259" r:id="rId4"/>
     <p:sldId id="260" r:id="rId5"/>
-    <p:sldId id="258" r:id="rId6"/>
+    <p:sldId id="261" r:id="rId6"/>
+    <p:sldId id="262" r:id="rId7"/>
+    <p:sldId id="258" r:id="rId8"/>
   </p:sldIdLst>
   <p:sldSz cx="9144000" cy="5143500" type="screen16x9"/>
   <p:notesSz cx="6858000" cy="9144000"/>
@@ -271,7 +273,7 @@
               <a:pPr>
                 <a:defRPr/>
               </a:pPr>
-              <a:t>5/31/17</a:t>
+              <a:t>6/14/17</a:t>
             </a:fld>
             <a:endParaRPr lang="en-US" dirty="0"/>
           </a:p>
@@ -10852,7 +10854,6 @@
               <a:rPr lang="en-US" dirty="0" smtClean="0"/>
               <a:t>Backend resolves queries and returns only desired data</a:t>
             </a:r>
-            <a:endParaRPr lang="en-US" dirty="0" smtClean="0"/>
           </a:p>
           <a:p>
             <a:r>
@@ -10892,7 +10893,6 @@
               <a:rPr lang="en-US" dirty="0" smtClean="0"/>
               <a:t>roundtrips</a:t>
             </a:r>
-            <a:endParaRPr lang="en-US" dirty="0" smtClean="0"/>
           </a:p>
           <a:p>
             <a:pPr lvl="1"/>
@@ -12465,11 +12465,6 @@
                 </a:rPr>
                 <a:t>“Links” are translated to graph structure</a:t>
               </a:r>
-              <a:endParaRPr lang="en-US" sz="1400" b="1" dirty="0">
-                <a:solidFill>
-                  <a:schemeClr val="tx1"/>
-                </a:solidFill>
-              </a:endParaRPr>
             </a:p>
           </p:txBody>
         </p:sp>
@@ -13440,6 +13435,2038 @@
           <a:chExt cx="0" cy="0"/>
         </a:xfrm>
       </p:grpSpPr>
+      <p:sp>
+        <p:nvSpPr>
+          <p:cNvPr id="2" name="Title 1"/>
+          <p:cNvSpPr>
+            <a:spLocks noGrp="1"/>
+          </p:cNvSpPr>
+          <p:nvPr>
+            <p:ph type="title"/>
+          </p:nvPr>
+        </p:nvSpPr>
+        <p:spPr/>
+        <p:txBody>
+          <a:bodyPr/>
+          <a:lstStyle/>
+          <a:p>
+            <a:r>
+              <a:rPr lang="en-US" dirty="0" smtClean="0"/>
+              <a:t>Images</a:t>
+            </a:r>
+            <a:endParaRPr lang="en-US" dirty="0"/>
+          </a:p>
+        </p:txBody>
+      </p:sp>
+      <p:grpSp>
+        <p:nvGrpSpPr>
+          <p:cNvPr id="17" name="Group 16"/>
+          <p:cNvGrpSpPr/>
+          <p:nvPr/>
+        </p:nvGrpSpPr>
+        <p:grpSpPr>
+          <a:xfrm>
+            <a:off x="1895059" y="82567"/>
+            <a:ext cx="4201759" cy="911772"/>
+            <a:chOff x="274320" y="1001487"/>
+            <a:chExt cx="4201759" cy="911772"/>
+          </a:xfrm>
+        </p:grpSpPr>
+        <p:pic>
+          <p:nvPicPr>
+            <p:cNvPr id="4" name="Picture 3"/>
+            <p:cNvPicPr>
+              <a:picLocks noChangeAspect="1"/>
+            </p:cNvPicPr>
+            <p:nvPr/>
+          </p:nvPicPr>
+          <p:blipFill>
+            <a:blip r:embed="rId2">
+              <a:extLst>
+                <a:ext uri="{28A0092B-C50C-407E-A947-70E740481C1C}">
+                  <a14:useLocalDpi xmlns:a14="http://schemas.microsoft.com/office/drawing/2010/main" val="0"/>
+                </a:ext>
+              </a:extLst>
+            </a:blip>
+            <a:stretch>
+              <a:fillRect/>
+            </a:stretch>
+          </p:blipFill>
+          <p:spPr>
+            <a:xfrm>
+              <a:off x="274320" y="1001487"/>
+              <a:ext cx="911772" cy="911772"/>
+            </a:xfrm>
+            <a:prstGeom prst="rect">
+              <a:avLst/>
+            </a:prstGeom>
+          </p:spPr>
+        </p:pic>
+        <p:sp>
+          <p:nvSpPr>
+            <p:cNvPr id="5" name="Right Arrow 4"/>
+            <p:cNvSpPr/>
+            <p:nvPr/>
+          </p:nvSpPr>
+          <p:spPr>
+            <a:xfrm>
+              <a:off x="1470135" y="1314450"/>
+              <a:ext cx="720615" cy="408637"/>
+            </a:xfrm>
+            <a:prstGeom prst="rightArrow">
+              <a:avLst/>
+            </a:prstGeom>
+            <a:solidFill>
+              <a:schemeClr val="bg1"/>
+            </a:solidFill>
+            <a:ln>
+              <a:noFill/>
+            </a:ln>
+          </p:spPr>
+          <p:style>
+            <a:lnRef idx="2">
+              <a:schemeClr val="accent1">
+                <a:shade val="50000"/>
+              </a:schemeClr>
+            </a:lnRef>
+            <a:fillRef idx="1">
+              <a:schemeClr val="accent1"/>
+            </a:fillRef>
+            <a:effectRef idx="0">
+              <a:schemeClr val="accent1"/>
+            </a:effectRef>
+            <a:fontRef idx="minor">
+              <a:schemeClr val="lt1"/>
+            </a:fontRef>
+          </p:style>
+          <p:txBody>
+            <a:bodyPr rtlCol="0" anchor="ctr"/>
+            <a:lstStyle/>
+            <a:p>
+              <a:pPr algn="ctr"/>
+              <a:endParaRPr lang="en-US" sz="1000" b="1" dirty="0">
+                <a:solidFill>
+                  <a:schemeClr val="tx1"/>
+                </a:solidFill>
+              </a:endParaRPr>
+            </a:p>
+          </p:txBody>
+        </p:sp>
+        <p:pic>
+          <p:nvPicPr>
+            <p:cNvPr id="6" name="Picture 5"/>
+            <p:cNvPicPr>
+              <a:picLocks noChangeAspect="1"/>
+            </p:cNvPicPr>
+            <p:nvPr/>
+          </p:nvPicPr>
+          <p:blipFill>
+            <a:blip r:embed="rId3">
+              <a:extLst>
+                <a:ext uri="{28A0092B-C50C-407E-A947-70E740481C1C}">
+                  <a14:useLocalDpi xmlns:a14="http://schemas.microsoft.com/office/drawing/2010/main" val="0"/>
+                </a:ext>
+              </a:extLst>
+            </a:blip>
+            <a:stretch>
+              <a:fillRect/>
+            </a:stretch>
+          </p:blipFill>
+          <p:spPr>
+            <a:xfrm>
+              <a:off x="2321458" y="1159142"/>
+              <a:ext cx="2154621" cy="754117"/>
+            </a:xfrm>
+            <a:prstGeom prst="rect">
+              <a:avLst/>
+            </a:prstGeom>
+          </p:spPr>
+        </p:pic>
+      </p:grpSp>
+      <p:grpSp>
+        <p:nvGrpSpPr>
+          <p:cNvPr id="16" name="Group 15"/>
+          <p:cNvGrpSpPr/>
+          <p:nvPr/>
+        </p:nvGrpSpPr>
+        <p:grpSpPr>
+          <a:xfrm>
+            <a:off x="385831" y="3149132"/>
+            <a:ext cx="5051848" cy="1614663"/>
+            <a:chOff x="697981" y="3007883"/>
+            <a:chExt cx="5051848" cy="1614663"/>
+          </a:xfrm>
+        </p:grpSpPr>
+        <p:pic>
+          <p:nvPicPr>
+            <p:cNvPr id="7" name="Picture 6"/>
+            <p:cNvPicPr>
+              <a:picLocks noChangeAspect="1"/>
+            </p:cNvPicPr>
+            <p:nvPr/>
+          </p:nvPicPr>
+          <p:blipFill>
+            <a:blip r:embed="rId2">
+              <a:extLst>
+                <a:ext uri="{28A0092B-C50C-407E-A947-70E740481C1C}">
+                  <a14:useLocalDpi xmlns:a14="http://schemas.microsoft.com/office/drawing/2010/main" val="0"/>
+                </a:ext>
+              </a:extLst>
+            </a:blip>
+            <a:stretch>
+              <a:fillRect/>
+            </a:stretch>
+          </p:blipFill>
+          <p:spPr>
+            <a:xfrm>
+              <a:off x="787788" y="3007883"/>
+              <a:ext cx="284388" cy="284388"/>
+            </a:xfrm>
+            <a:prstGeom prst="rect">
+              <a:avLst/>
+            </a:prstGeom>
+          </p:spPr>
+        </p:pic>
+        <p:pic>
+          <p:nvPicPr>
+            <p:cNvPr id="10" name="Picture 9"/>
+            <p:cNvPicPr>
+              <a:picLocks noChangeAspect="1"/>
+            </p:cNvPicPr>
+            <p:nvPr/>
+          </p:nvPicPr>
+          <p:blipFill>
+            <a:blip r:embed="rId4"/>
+            <a:stretch>
+              <a:fillRect/>
+            </a:stretch>
+          </p:blipFill>
+          <p:spPr>
+            <a:xfrm>
+              <a:off x="3398768" y="3009775"/>
+              <a:ext cx="2351061" cy="1612771"/>
+            </a:xfrm>
+            <a:prstGeom prst="rect">
+              <a:avLst/>
+            </a:prstGeom>
+          </p:spPr>
+        </p:pic>
+        <p:sp>
+          <p:nvSpPr>
+            <p:cNvPr id="11" name="Rectangle 10"/>
+            <p:cNvSpPr/>
+            <p:nvPr/>
+          </p:nvSpPr>
+          <p:spPr>
+            <a:xfrm>
+              <a:off x="3878317" y="3847606"/>
+              <a:ext cx="1082566" cy="524698"/>
+            </a:xfrm>
+            <a:prstGeom prst="rect">
+              <a:avLst/>
+            </a:prstGeom>
+            <a:solidFill>
+              <a:schemeClr val="accent6">
+                <a:alpha val="30000"/>
+              </a:schemeClr>
+            </a:solidFill>
+            <a:ln>
+              <a:noFill/>
+            </a:ln>
+          </p:spPr>
+          <p:style>
+            <a:lnRef idx="2">
+              <a:schemeClr val="accent1">
+                <a:shade val="50000"/>
+              </a:schemeClr>
+            </a:lnRef>
+            <a:fillRef idx="1">
+              <a:schemeClr val="accent1"/>
+            </a:fillRef>
+            <a:effectRef idx="0">
+              <a:schemeClr val="accent1"/>
+            </a:effectRef>
+            <a:fontRef idx="minor">
+              <a:schemeClr val="lt1"/>
+            </a:fontRef>
+          </p:style>
+          <p:txBody>
+            <a:bodyPr rtlCol="0" anchor="ctr"/>
+            <a:lstStyle/>
+            <a:p>
+              <a:pPr algn="ctr"/>
+              <a:endParaRPr lang="en-US"/>
+            </a:p>
+          </p:txBody>
+        </p:sp>
+        <p:grpSp>
+          <p:nvGrpSpPr>
+            <p:cNvPr id="15" name="Group 14"/>
+            <p:cNvGrpSpPr/>
+            <p:nvPr/>
+          </p:nvGrpSpPr>
+          <p:grpSpPr>
+            <a:xfrm>
+              <a:off x="697981" y="3238341"/>
+              <a:ext cx="1834739" cy="1169551"/>
+              <a:chOff x="611578" y="2777425"/>
+              <a:chExt cx="1834739" cy="1169551"/>
+            </a:xfrm>
+          </p:grpSpPr>
+          <p:sp>
+            <p:nvSpPr>
+              <p:cNvPr id="8" name="TextBox 7"/>
+              <p:cNvSpPr txBox="1"/>
+              <p:nvPr/>
+            </p:nvSpPr>
+            <p:spPr>
+              <a:xfrm>
+                <a:off x="611578" y="2777425"/>
+                <a:ext cx="1834739" cy="1169551"/>
+              </a:xfrm>
+              <a:prstGeom prst="rect">
+                <a:avLst/>
+              </a:prstGeom>
+              <a:noFill/>
+            </p:spPr>
+            <p:txBody>
+              <a:bodyPr wrap="square" rtlCol="0">
+                <a:spAutoFit/>
+              </a:bodyPr>
+              <a:lstStyle/>
+              <a:p>
+                <a:r>
+                  <a:rPr lang="mr-IN" sz="1000" dirty="0" smtClean="0">
+                    <a:latin typeface="Courier New" charset="0"/>
+                    <a:ea typeface="Courier New" charset="0"/>
+                    <a:cs typeface="Courier New" charset="0"/>
+                  </a:rPr>
+                  <a:t>...</a:t>
+                </a:r>
+                <a:endParaRPr lang="en-US" sz="1000" dirty="0" smtClean="0">
+                  <a:latin typeface="Courier New" charset="0"/>
+                  <a:ea typeface="Courier New" charset="0"/>
+                  <a:cs typeface="Courier New" charset="0"/>
+                </a:endParaRPr>
+              </a:p>
+              <a:p>
+                <a:r>
+                  <a:rPr lang="mr-IN" sz="1000" dirty="0" smtClean="0">
+                    <a:latin typeface="Courier New" charset="0"/>
+                    <a:ea typeface="Courier New" charset="0"/>
+                    <a:cs typeface="Courier New" charset="0"/>
+                  </a:rPr>
+                  <a:t>  /</a:t>
+                </a:r>
+                <a:r>
+                  <a:rPr lang="mr-IN" sz="1000" dirty="0" err="1">
+                    <a:latin typeface="Courier New" charset="0"/>
+                    <a:ea typeface="Courier New" charset="0"/>
+                    <a:cs typeface="Courier New" charset="0"/>
+                  </a:rPr>
+                  <a:t>users</a:t>
+                </a:r>
+                <a:r>
+                  <a:rPr lang="mr-IN" sz="1000" dirty="0">
+                    <a:latin typeface="Courier New" charset="0"/>
+                    <a:ea typeface="Courier New" charset="0"/>
+                    <a:cs typeface="Courier New" charset="0"/>
+                  </a:rPr>
+                  <a:t>/{</a:t>
+                </a:r>
+                <a:r>
+                  <a:rPr lang="mr-IN" sz="1000" dirty="0" err="1">
+                    <a:latin typeface="Courier New" charset="0"/>
+                    <a:ea typeface="Courier New" charset="0"/>
+                    <a:cs typeface="Courier New" charset="0"/>
+                  </a:rPr>
+                  <a:t>username</a:t>
+                </a:r>
+                <a:r>
+                  <a:rPr lang="mr-IN" sz="1000" dirty="0" smtClean="0">
+                    <a:latin typeface="Courier New" charset="0"/>
+                    <a:ea typeface="Courier New" charset="0"/>
+                    <a:cs typeface="Courier New" charset="0"/>
+                  </a:rPr>
+                  <a:t>}:</a:t>
+                </a:r>
+                <a:endParaRPr lang="en-US" sz="1000" dirty="0" smtClean="0">
+                  <a:latin typeface="Courier New" charset="0"/>
+                  <a:ea typeface="Courier New" charset="0"/>
+                  <a:cs typeface="Courier New" charset="0"/>
+                </a:endParaRPr>
+              </a:p>
+              <a:p>
+                <a:r>
+                  <a:rPr lang="mr-IN" sz="1000" dirty="0" smtClean="0">
+                    <a:latin typeface="Courier New" charset="0"/>
+                    <a:ea typeface="Courier New" charset="0"/>
+                    <a:cs typeface="Courier New" charset="0"/>
+                  </a:rPr>
+                  <a:t>    </a:t>
+                </a:r>
+                <a:r>
+                  <a:rPr lang="mr-IN" sz="1000" dirty="0" err="1">
+                    <a:latin typeface="Courier New" charset="0"/>
+                    <a:ea typeface="Courier New" charset="0"/>
+                    <a:cs typeface="Courier New" charset="0"/>
+                  </a:rPr>
+                  <a:t>links</a:t>
+                </a:r>
+                <a:r>
+                  <a:rPr lang="mr-IN" sz="1000" dirty="0" smtClean="0">
+                    <a:latin typeface="Courier New" charset="0"/>
+                    <a:ea typeface="Courier New" charset="0"/>
+                    <a:cs typeface="Courier New" charset="0"/>
+                  </a:rPr>
+                  <a:t>:</a:t>
+                </a:r>
+                <a:endParaRPr lang="en-US" sz="1000" dirty="0" smtClean="0">
+                  <a:latin typeface="Courier New" charset="0"/>
+                  <a:ea typeface="Courier New" charset="0"/>
+                  <a:cs typeface="Courier New" charset="0"/>
+                </a:endParaRPr>
+              </a:p>
+              <a:p>
+                <a:r>
+                  <a:rPr lang="mr-IN" sz="1000" dirty="0" smtClean="0">
+                    <a:latin typeface="Courier New" charset="0"/>
+                    <a:ea typeface="Courier New" charset="0"/>
+                    <a:cs typeface="Courier New" charset="0"/>
+                  </a:rPr>
+                  <a:t>      </a:t>
+                </a:r>
+                <a:r>
+                  <a:rPr lang="mr-IN" sz="1000" dirty="0" err="1" smtClean="0">
+                    <a:latin typeface="Courier New" charset="0"/>
+                    <a:ea typeface="Courier New" charset="0"/>
+                    <a:cs typeface="Courier New" charset="0"/>
+                  </a:rPr>
+                  <a:t>employerCompany</a:t>
+                </a:r>
+                <a:endParaRPr lang="en-US" sz="1000" dirty="0" smtClean="0">
+                  <a:latin typeface="Courier New" charset="0"/>
+                  <a:ea typeface="Courier New" charset="0"/>
+                  <a:cs typeface="Courier New" charset="0"/>
+                </a:endParaRPr>
+              </a:p>
+              <a:p>
+                <a:r>
+                  <a:rPr lang="mr-IN" sz="1000" dirty="0" smtClean="0">
+                    <a:latin typeface="Courier New" charset="0"/>
+                    <a:ea typeface="Courier New" charset="0"/>
+                    <a:cs typeface="Courier New" charset="0"/>
+                  </a:rPr>
+                  <a:t>       ...</a:t>
+                </a:r>
+                <a:endParaRPr lang="en-US" sz="1000" dirty="0" smtClean="0">
+                  <a:latin typeface="Courier New" charset="0"/>
+                  <a:ea typeface="Courier New" charset="0"/>
+                  <a:cs typeface="Courier New" charset="0"/>
+                </a:endParaRPr>
+              </a:p>
+              <a:p>
+                <a:r>
+                  <a:rPr lang="mr-IN" sz="1000" dirty="0" smtClean="0">
+                    <a:latin typeface="Courier New" charset="0"/>
+                    <a:ea typeface="Courier New" charset="0"/>
+                    <a:cs typeface="Courier New" charset="0"/>
+                  </a:rPr>
+                  <a:t>  </a:t>
+                </a:r>
+                <a:r>
+                  <a:rPr lang="mr-IN" sz="1000" dirty="0">
+                    <a:latin typeface="Courier New" charset="0"/>
+                    <a:ea typeface="Courier New" charset="0"/>
+                    <a:cs typeface="Courier New" charset="0"/>
+                  </a:rPr>
+                  <a:t>/</a:t>
+                </a:r>
+                <a:r>
+                  <a:rPr lang="mr-IN" sz="1000" dirty="0" err="1">
+                    <a:latin typeface="Courier New" charset="0"/>
+                    <a:ea typeface="Courier New" charset="0"/>
+                    <a:cs typeface="Courier New" charset="0"/>
+                  </a:rPr>
+                  <a:t>companies</a:t>
+                </a:r>
+                <a:r>
+                  <a:rPr lang="mr-IN" sz="1000" dirty="0">
+                    <a:latin typeface="Courier New" charset="0"/>
+                    <a:ea typeface="Courier New" charset="0"/>
+                    <a:cs typeface="Courier New" charset="0"/>
+                  </a:rPr>
+                  <a:t>/{</a:t>
+                </a:r>
+                <a:r>
+                  <a:rPr lang="mr-IN" sz="1000" dirty="0" err="1">
+                    <a:latin typeface="Courier New" charset="0"/>
+                    <a:ea typeface="Courier New" charset="0"/>
+                    <a:cs typeface="Courier New" charset="0"/>
+                  </a:rPr>
+                  <a:t>id</a:t>
+                </a:r>
+                <a:r>
+                  <a:rPr lang="mr-IN" sz="1000" dirty="0" smtClean="0">
+                    <a:latin typeface="Courier New" charset="0"/>
+                    <a:ea typeface="Courier New" charset="0"/>
+                    <a:cs typeface="Courier New" charset="0"/>
+                  </a:rPr>
+                  <a:t>}:</a:t>
+                </a:r>
+                <a:endParaRPr lang="en-US" sz="1000" dirty="0" smtClean="0">
+                  <a:latin typeface="Courier New" charset="0"/>
+                  <a:ea typeface="Courier New" charset="0"/>
+                  <a:cs typeface="Courier New" charset="0"/>
+                </a:endParaRPr>
+              </a:p>
+              <a:p>
+                <a:r>
+                  <a:rPr lang="mr-IN" sz="1000" dirty="0" smtClean="0">
+                    <a:latin typeface="Courier New" charset="0"/>
+                    <a:ea typeface="Courier New" charset="0"/>
+                    <a:cs typeface="Courier New" charset="0"/>
+                  </a:rPr>
+                  <a:t>    </a:t>
+                </a:r>
+                <a:r>
+                  <a:rPr lang="mr-IN" sz="1000" dirty="0">
+                    <a:latin typeface="Courier New" charset="0"/>
+                    <a:ea typeface="Courier New" charset="0"/>
+                    <a:cs typeface="Courier New" charset="0"/>
+                  </a:rPr>
+                  <a:t>...</a:t>
+                </a:r>
+                <a:endParaRPr lang="en-US" sz="1000" dirty="0">
+                  <a:latin typeface="Courier New" charset="0"/>
+                  <a:ea typeface="Courier New" charset="0"/>
+                  <a:cs typeface="Courier New" charset="0"/>
+                </a:endParaRPr>
+              </a:p>
+            </p:txBody>
+          </p:sp>
+          <p:sp>
+            <p:nvSpPr>
+              <p:cNvPr id="12" name="Rectangle 11"/>
+              <p:cNvSpPr/>
+              <p:nvPr/>
+            </p:nvSpPr>
+            <p:spPr>
+              <a:xfrm>
+                <a:off x="987663" y="3129776"/>
+                <a:ext cx="1387401" cy="464054"/>
+              </a:xfrm>
+              <a:prstGeom prst="rect">
+                <a:avLst/>
+              </a:prstGeom>
+              <a:solidFill>
+                <a:schemeClr val="accent6">
+                  <a:alpha val="30000"/>
+                </a:schemeClr>
+              </a:solidFill>
+              <a:ln>
+                <a:noFill/>
+              </a:ln>
+            </p:spPr>
+            <p:style>
+              <a:lnRef idx="2">
+                <a:schemeClr val="accent1">
+                  <a:shade val="50000"/>
+                </a:schemeClr>
+              </a:lnRef>
+              <a:fillRef idx="1">
+                <a:schemeClr val="accent1"/>
+              </a:fillRef>
+              <a:effectRef idx="0">
+                <a:schemeClr val="accent1"/>
+              </a:effectRef>
+              <a:fontRef idx="minor">
+                <a:schemeClr val="lt1"/>
+              </a:fontRef>
+            </p:style>
+            <p:txBody>
+              <a:bodyPr rtlCol="0" anchor="ctr"/>
+              <a:lstStyle/>
+              <a:p>
+                <a:pPr algn="ctr"/>
+                <a:endParaRPr lang="en-US"/>
+              </a:p>
+            </p:txBody>
+          </p:sp>
+        </p:grpSp>
+        <p:cxnSp>
+          <p:nvCxnSpPr>
+            <p:cNvPr id="14" name="Curved Connector 13"/>
+            <p:cNvCxnSpPr>
+              <a:stCxn id="12" idx="3"/>
+              <a:endCxn id="11" idx="1"/>
+            </p:cNvCxnSpPr>
+            <p:nvPr/>
+          </p:nvCxnSpPr>
+          <p:spPr>
+            <a:xfrm>
+              <a:off x="2461467" y="3822719"/>
+              <a:ext cx="1416850" cy="287236"/>
+            </a:xfrm>
+            <a:prstGeom prst="curvedConnector3">
+              <a:avLst/>
+            </a:prstGeom>
+            <a:ln w="19050">
+              <a:solidFill>
+                <a:schemeClr val="accent6"/>
+              </a:solidFill>
+              <a:tailEnd type="triangle"/>
+            </a:ln>
+          </p:spPr>
+          <p:style>
+            <a:lnRef idx="1">
+              <a:schemeClr val="accent1"/>
+            </a:lnRef>
+            <a:fillRef idx="0">
+              <a:schemeClr val="accent1"/>
+            </a:fillRef>
+            <a:effectRef idx="0">
+              <a:schemeClr val="accent1"/>
+            </a:effectRef>
+            <a:fontRef idx="minor">
+              <a:schemeClr val="tx1"/>
+            </a:fontRef>
+          </p:style>
+        </p:cxnSp>
+      </p:grpSp>
+      <p:grpSp>
+        <p:nvGrpSpPr>
+          <p:cNvPr id="33" name="Group 32"/>
+          <p:cNvGrpSpPr/>
+          <p:nvPr/>
+        </p:nvGrpSpPr>
+        <p:grpSpPr>
+          <a:xfrm>
+            <a:off x="385831" y="1383207"/>
+            <a:ext cx="5051848" cy="1400009"/>
+            <a:chOff x="385831" y="1383207"/>
+            <a:chExt cx="5051848" cy="1400009"/>
+          </a:xfrm>
+        </p:grpSpPr>
+        <p:pic>
+          <p:nvPicPr>
+            <p:cNvPr id="30" name="Picture 29"/>
+            <p:cNvPicPr>
+              <a:picLocks noChangeAspect="1"/>
+            </p:cNvPicPr>
+            <p:nvPr/>
+          </p:nvPicPr>
+          <p:blipFill>
+            <a:blip r:embed="rId5"/>
+            <a:stretch>
+              <a:fillRect/>
+            </a:stretch>
+          </p:blipFill>
+          <p:spPr>
+            <a:xfrm>
+              <a:off x="3086618" y="1383207"/>
+              <a:ext cx="2351061" cy="1135987"/>
+            </a:xfrm>
+            <a:prstGeom prst="rect">
+              <a:avLst/>
+            </a:prstGeom>
+          </p:spPr>
+        </p:pic>
+        <p:pic>
+          <p:nvPicPr>
+            <p:cNvPr id="20" name="Picture 19"/>
+            <p:cNvPicPr>
+              <a:picLocks noChangeAspect="1"/>
+            </p:cNvPicPr>
+            <p:nvPr/>
+          </p:nvPicPr>
+          <p:blipFill>
+            <a:blip r:embed="rId2">
+              <a:extLst>
+                <a:ext uri="{28A0092B-C50C-407E-A947-70E740481C1C}">
+                  <a14:useLocalDpi xmlns:a14="http://schemas.microsoft.com/office/drawing/2010/main" val="0"/>
+                </a:ext>
+              </a:extLst>
+            </a:blip>
+            <a:stretch>
+              <a:fillRect/>
+            </a:stretch>
+          </p:blipFill>
+          <p:spPr>
+            <a:xfrm>
+              <a:off x="475638" y="1383207"/>
+              <a:ext cx="284388" cy="284388"/>
+            </a:xfrm>
+            <a:prstGeom prst="rect">
+              <a:avLst/>
+            </a:prstGeom>
+          </p:spPr>
+        </p:pic>
+        <p:sp>
+          <p:nvSpPr>
+            <p:cNvPr id="22" name="Rectangle 21"/>
+            <p:cNvSpPr/>
+            <p:nvPr/>
+          </p:nvSpPr>
+          <p:spPr>
+            <a:xfrm>
+              <a:off x="3474411" y="1971971"/>
+              <a:ext cx="1446993" cy="414390"/>
+            </a:xfrm>
+            <a:prstGeom prst="rect">
+              <a:avLst/>
+            </a:prstGeom>
+            <a:solidFill>
+              <a:schemeClr val="accent6">
+                <a:alpha val="30000"/>
+              </a:schemeClr>
+            </a:solidFill>
+            <a:ln>
+              <a:noFill/>
+            </a:ln>
+          </p:spPr>
+          <p:style>
+            <a:lnRef idx="2">
+              <a:schemeClr val="accent1">
+                <a:shade val="50000"/>
+              </a:schemeClr>
+            </a:lnRef>
+            <a:fillRef idx="1">
+              <a:schemeClr val="accent1"/>
+            </a:fillRef>
+            <a:effectRef idx="0">
+              <a:schemeClr val="accent1"/>
+            </a:effectRef>
+            <a:fontRef idx="minor">
+              <a:schemeClr val="lt1"/>
+            </a:fontRef>
+          </p:style>
+          <p:txBody>
+            <a:bodyPr rtlCol="0" anchor="ctr"/>
+            <a:lstStyle/>
+            <a:p>
+              <a:pPr algn="ctr"/>
+              <a:endParaRPr lang="en-US"/>
+            </a:p>
+          </p:txBody>
+        </p:sp>
+        <p:grpSp>
+          <p:nvGrpSpPr>
+            <p:cNvPr id="23" name="Group 22"/>
+            <p:cNvGrpSpPr/>
+            <p:nvPr/>
+          </p:nvGrpSpPr>
+          <p:grpSpPr>
+            <a:xfrm>
+              <a:off x="385831" y="1613665"/>
+              <a:ext cx="1834739" cy="1169551"/>
+              <a:chOff x="611578" y="2777425"/>
+              <a:chExt cx="1834739" cy="1169551"/>
+            </a:xfrm>
+          </p:grpSpPr>
+          <p:sp>
+            <p:nvSpPr>
+              <p:cNvPr id="25" name="TextBox 24"/>
+              <p:cNvSpPr txBox="1"/>
+              <p:nvPr/>
+            </p:nvSpPr>
+            <p:spPr>
+              <a:xfrm>
+                <a:off x="611578" y="2777425"/>
+                <a:ext cx="1834739" cy="1169551"/>
+              </a:xfrm>
+              <a:prstGeom prst="rect">
+                <a:avLst/>
+              </a:prstGeom>
+              <a:noFill/>
+            </p:spPr>
+            <p:txBody>
+              <a:bodyPr wrap="square" rtlCol="0">
+                <a:spAutoFit/>
+              </a:bodyPr>
+              <a:lstStyle/>
+              <a:p>
+                <a:r>
+                  <a:rPr lang="mr-IN" sz="1000" dirty="0" smtClean="0">
+                    <a:latin typeface="Courier New" charset="0"/>
+                    <a:ea typeface="Courier New" charset="0"/>
+                    <a:cs typeface="Courier New" charset="0"/>
+                  </a:rPr>
+                  <a:t>...</a:t>
+                </a:r>
+                <a:endParaRPr lang="en-US" sz="1000" dirty="0" smtClean="0">
+                  <a:latin typeface="Courier New" charset="0"/>
+                  <a:ea typeface="Courier New" charset="0"/>
+                  <a:cs typeface="Courier New" charset="0"/>
+                </a:endParaRPr>
+              </a:p>
+              <a:p>
+                <a:r>
+                  <a:rPr lang="mr-IN" sz="1000" dirty="0" smtClean="0">
+                    <a:latin typeface="Courier New" charset="0"/>
+                    <a:ea typeface="Courier New" charset="0"/>
+                    <a:cs typeface="Courier New" charset="0"/>
+                  </a:rPr>
+                  <a:t>  /</a:t>
+                </a:r>
+                <a:r>
+                  <a:rPr lang="mr-IN" sz="1000" dirty="0" err="1">
+                    <a:latin typeface="Courier New" charset="0"/>
+                    <a:ea typeface="Courier New" charset="0"/>
+                    <a:cs typeface="Courier New" charset="0"/>
+                  </a:rPr>
+                  <a:t>users</a:t>
+                </a:r>
+                <a:r>
+                  <a:rPr lang="mr-IN" sz="1000" dirty="0">
+                    <a:latin typeface="Courier New" charset="0"/>
+                    <a:ea typeface="Courier New" charset="0"/>
+                    <a:cs typeface="Courier New" charset="0"/>
+                  </a:rPr>
+                  <a:t>/{</a:t>
+                </a:r>
+                <a:r>
+                  <a:rPr lang="mr-IN" sz="1000" dirty="0" err="1">
+                    <a:latin typeface="Courier New" charset="0"/>
+                    <a:ea typeface="Courier New" charset="0"/>
+                    <a:cs typeface="Courier New" charset="0"/>
+                  </a:rPr>
+                  <a:t>username</a:t>
+                </a:r>
+                <a:r>
+                  <a:rPr lang="mr-IN" sz="1000" dirty="0" smtClean="0">
+                    <a:latin typeface="Courier New" charset="0"/>
+                    <a:ea typeface="Courier New" charset="0"/>
+                    <a:cs typeface="Courier New" charset="0"/>
+                  </a:rPr>
+                  <a:t>}:</a:t>
+                </a:r>
+                <a:endParaRPr lang="en-US" sz="1000" dirty="0" smtClean="0">
+                  <a:latin typeface="Courier New" charset="0"/>
+                  <a:ea typeface="Courier New" charset="0"/>
+                  <a:cs typeface="Courier New" charset="0"/>
+                </a:endParaRPr>
+              </a:p>
+              <a:p>
+                <a:r>
+                  <a:rPr lang="mr-IN" sz="1000" dirty="0" smtClean="0">
+                    <a:latin typeface="Courier New" charset="0"/>
+                    <a:ea typeface="Courier New" charset="0"/>
+                    <a:cs typeface="Courier New" charset="0"/>
+                  </a:rPr>
+                  <a:t>    </a:t>
+                </a:r>
+                <a:r>
+                  <a:rPr lang="en-US" sz="1000" dirty="0" smtClean="0">
+                    <a:latin typeface="Courier New" charset="0"/>
+                    <a:ea typeface="Courier New" charset="0"/>
+                    <a:cs typeface="Courier New" charset="0"/>
+                  </a:rPr>
+                  <a:t>schema:</a:t>
+                </a:r>
+              </a:p>
+              <a:p>
+                <a:r>
+                  <a:rPr lang="en-US" sz="1000" dirty="0">
+                    <a:latin typeface="Courier New" charset="0"/>
+                    <a:ea typeface="Courier New" charset="0"/>
+                    <a:cs typeface="Courier New" charset="0"/>
+                  </a:rPr>
+                  <a:t> </a:t>
+                </a:r>
+                <a:r>
+                  <a:rPr lang="en-US" sz="1000" dirty="0" smtClean="0">
+                    <a:latin typeface="Courier New" charset="0"/>
+                    <a:ea typeface="Courier New" charset="0"/>
+                    <a:cs typeface="Courier New" charset="0"/>
+                  </a:rPr>
+                  <a:t>     type: object</a:t>
+                </a:r>
+              </a:p>
+              <a:p>
+                <a:r>
+                  <a:rPr lang="en-US" sz="1000" dirty="0">
+                    <a:latin typeface="Courier New" charset="0"/>
+                    <a:ea typeface="Courier New" charset="0"/>
+                    <a:cs typeface="Courier New" charset="0"/>
+                  </a:rPr>
+                  <a:t> </a:t>
+                </a:r>
+                <a:r>
+                  <a:rPr lang="en-US" sz="1000" dirty="0" smtClean="0">
+                    <a:latin typeface="Courier New" charset="0"/>
+                    <a:ea typeface="Courier New" charset="0"/>
+                    <a:cs typeface="Courier New" charset="0"/>
+                  </a:rPr>
+                  <a:t>     properties:</a:t>
+                </a:r>
+              </a:p>
+              <a:p>
+                <a:r>
+                  <a:rPr lang="en-US" sz="1000" dirty="0">
+                    <a:latin typeface="Courier New" charset="0"/>
+                    <a:ea typeface="Courier New" charset="0"/>
+                    <a:cs typeface="Courier New" charset="0"/>
+                  </a:rPr>
+                  <a:t> </a:t>
+                </a:r>
+                <a:r>
+                  <a:rPr lang="en-US" sz="1000" dirty="0" smtClean="0">
+                    <a:latin typeface="Courier New" charset="0"/>
+                    <a:ea typeface="Courier New" charset="0"/>
+                    <a:cs typeface="Courier New" charset="0"/>
+                  </a:rPr>
+                  <a:t>       name:</a:t>
+                </a:r>
+              </a:p>
+              <a:p>
+                <a:r>
+                  <a:rPr lang="en-US" sz="1000" dirty="0" smtClean="0">
+                    <a:latin typeface="Courier New" charset="0"/>
+                    <a:ea typeface="Courier New" charset="0"/>
+                    <a:cs typeface="Courier New" charset="0"/>
+                  </a:rPr>
+                  <a:t>     </a:t>
+                </a:r>
+                <a:r>
+                  <a:rPr lang="mr-IN" sz="1000" dirty="0" smtClean="0">
+                    <a:latin typeface="Courier New" charset="0"/>
+                    <a:ea typeface="Courier New" charset="0"/>
+                    <a:cs typeface="Courier New" charset="0"/>
+                  </a:rPr>
+                  <a:t>    </a:t>
+                </a:r>
+                <a:r>
+                  <a:rPr lang="mr-IN" sz="1000" dirty="0">
+                    <a:latin typeface="Courier New" charset="0"/>
+                    <a:ea typeface="Courier New" charset="0"/>
+                    <a:cs typeface="Courier New" charset="0"/>
+                  </a:rPr>
+                  <a:t>...</a:t>
+                </a:r>
+                <a:endParaRPr lang="en-US" sz="1000" dirty="0">
+                  <a:latin typeface="Courier New" charset="0"/>
+                  <a:ea typeface="Courier New" charset="0"/>
+                  <a:cs typeface="Courier New" charset="0"/>
+                </a:endParaRPr>
+              </a:p>
+            </p:txBody>
+          </p:sp>
+          <p:sp>
+            <p:nvSpPr>
+              <p:cNvPr id="26" name="Rectangle 25"/>
+              <p:cNvSpPr/>
+              <p:nvPr/>
+            </p:nvSpPr>
+            <p:spPr>
+              <a:xfrm>
+                <a:off x="985773" y="3133762"/>
+                <a:ext cx="1135033" cy="777626"/>
+              </a:xfrm>
+              <a:prstGeom prst="rect">
+                <a:avLst/>
+              </a:prstGeom>
+              <a:solidFill>
+                <a:schemeClr val="accent6">
+                  <a:alpha val="30000"/>
+                </a:schemeClr>
+              </a:solidFill>
+              <a:ln>
+                <a:noFill/>
+              </a:ln>
+            </p:spPr>
+            <p:style>
+              <a:lnRef idx="2">
+                <a:schemeClr val="accent1">
+                  <a:shade val="50000"/>
+                </a:schemeClr>
+              </a:lnRef>
+              <a:fillRef idx="1">
+                <a:schemeClr val="accent1"/>
+              </a:fillRef>
+              <a:effectRef idx="0">
+                <a:schemeClr val="accent1"/>
+              </a:effectRef>
+              <a:fontRef idx="minor">
+                <a:schemeClr val="lt1"/>
+              </a:fontRef>
+            </p:style>
+            <p:txBody>
+              <a:bodyPr rtlCol="0" anchor="ctr"/>
+              <a:lstStyle/>
+              <a:p>
+                <a:pPr algn="ctr"/>
+                <a:endParaRPr lang="en-US"/>
+              </a:p>
+            </p:txBody>
+          </p:sp>
+        </p:grpSp>
+        <p:cxnSp>
+          <p:nvCxnSpPr>
+            <p:cNvPr id="24" name="Curved Connector 23"/>
+            <p:cNvCxnSpPr>
+              <a:stCxn id="26" idx="3"/>
+              <a:endCxn id="22" idx="1"/>
+            </p:cNvCxnSpPr>
+            <p:nvPr/>
+          </p:nvCxnSpPr>
+          <p:spPr>
+            <a:xfrm flipV="1">
+              <a:off x="1895059" y="2179166"/>
+              <a:ext cx="1579352" cy="179649"/>
+            </a:xfrm>
+            <a:prstGeom prst="curvedConnector3">
+              <a:avLst/>
+            </a:prstGeom>
+            <a:ln w="19050">
+              <a:solidFill>
+                <a:schemeClr val="accent6"/>
+              </a:solidFill>
+              <a:tailEnd type="triangle"/>
+            </a:ln>
+          </p:spPr>
+          <p:style>
+            <a:lnRef idx="1">
+              <a:schemeClr val="accent1"/>
+            </a:lnRef>
+            <a:fillRef idx="0">
+              <a:schemeClr val="accent1"/>
+            </a:fillRef>
+            <a:effectRef idx="0">
+              <a:schemeClr val="accent1"/>
+            </a:effectRef>
+            <a:fontRef idx="minor">
+              <a:schemeClr val="tx1"/>
+            </a:fontRef>
+          </p:style>
+        </p:cxnSp>
+      </p:grpSp>
+    </p:spTree>
+    <p:extLst>
+      <p:ext uri="{BB962C8B-B14F-4D97-AF65-F5344CB8AC3E}">
+        <p14:creationId xmlns:p14="http://schemas.microsoft.com/office/powerpoint/2010/main" val="1499849163"/>
+      </p:ext>
+    </p:extLst>
+  </p:cSld>
+  <p:clrMapOvr>
+    <a:masterClrMapping/>
+  </p:clrMapOvr>
+  <p:timing>
+    <p:tnLst>
+      <p:par>
+        <p:cTn id="1" dur="indefinite" restart="never" nodeType="tmRoot"/>
+      </p:par>
+    </p:tnLst>
+  </p:timing>
+</p:sld>
+</file>
+
+<file path=ppt/slides/slide6.xml><?xml version="1.0" encoding="utf-8"?>
+<p:sld xmlns:a="http://schemas.openxmlformats.org/drawingml/2006/main" xmlns:r="http://schemas.openxmlformats.org/officeDocument/2006/relationships" xmlns:p="http://schemas.openxmlformats.org/presentationml/2006/main">
+  <p:cSld>
+    <p:spTree>
+      <p:nvGrpSpPr>
+        <p:cNvPr id="1" name=""/>
+        <p:cNvGrpSpPr/>
+        <p:nvPr/>
+      </p:nvGrpSpPr>
+      <p:grpSpPr>
+        <a:xfrm>
+          <a:off x="0" y="0"/>
+          <a:ext cx="0" cy="0"/>
+          <a:chOff x="0" y="0"/>
+          <a:chExt cx="0" cy="0"/>
+        </a:xfrm>
+      </p:grpSpPr>
+      <p:sp>
+        <p:nvSpPr>
+          <p:cNvPr id="2" name="Title 1"/>
+          <p:cNvSpPr>
+            <a:spLocks noGrp="1"/>
+          </p:cNvSpPr>
+          <p:nvPr>
+            <p:ph type="title"/>
+          </p:nvPr>
+        </p:nvSpPr>
+        <p:spPr/>
+        <p:txBody>
+          <a:bodyPr/>
+          <a:lstStyle/>
+          <a:p>
+            <a:r>
+              <a:rPr lang="en-US" dirty="0" smtClean="0"/>
+              <a:t>Images 2</a:t>
+            </a:r>
+            <a:endParaRPr lang="en-US" dirty="0"/>
+          </a:p>
+        </p:txBody>
+      </p:sp>
+      <p:grpSp>
+        <p:nvGrpSpPr>
+          <p:cNvPr id="27" name="Group 26"/>
+          <p:cNvGrpSpPr/>
+          <p:nvPr/>
+        </p:nvGrpSpPr>
+        <p:grpSpPr>
+          <a:xfrm>
+            <a:off x="274320" y="754328"/>
+            <a:ext cx="4962040" cy="2114521"/>
+            <a:chOff x="475638" y="1506683"/>
+            <a:chExt cx="4962040" cy="2114521"/>
+          </a:xfrm>
+        </p:grpSpPr>
+        <p:pic>
+          <p:nvPicPr>
+            <p:cNvPr id="3" name="Picture 2"/>
+            <p:cNvPicPr>
+              <a:picLocks noChangeAspect="1"/>
+            </p:cNvPicPr>
+            <p:nvPr/>
+          </p:nvPicPr>
+          <p:blipFill>
+            <a:blip r:embed="rId2"/>
+            <a:stretch>
+              <a:fillRect/>
+            </a:stretch>
+          </p:blipFill>
+          <p:spPr>
+            <a:xfrm>
+              <a:off x="3086617" y="1506683"/>
+              <a:ext cx="2351061" cy="2114521"/>
+            </a:xfrm>
+            <a:prstGeom prst="rect">
+              <a:avLst/>
+            </a:prstGeom>
+          </p:spPr>
+        </p:pic>
+        <p:pic>
+          <p:nvPicPr>
+            <p:cNvPr id="20" name="Picture 19"/>
+            <p:cNvPicPr>
+              <a:picLocks noChangeAspect="1"/>
+            </p:cNvPicPr>
+            <p:nvPr/>
+          </p:nvPicPr>
+          <p:blipFill>
+            <a:blip r:embed="rId3">
+              <a:extLst>
+                <a:ext uri="{28A0092B-C50C-407E-A947-70E740481C1C}">
+                  <a14:useLocalDpi xmlns:a14="http://schemas.microsoft.com/office/drawing/2010/main" val="0"/>
+                </a:ext>
+              </a:extLst>
+            </a:blip>
+            <a:stretch>
+              <a:fillRect/>
+            </a:stretch>
+          </p:blipFill>
+          <p:spPr>
+            <a:xfrm>
+              <a:off x="498788" y="1508657"/>
+              <a:ext cx="284388" cy="284388"/>
+            </a:xfrm>
+            <a:prstGeom prst="rect">
+              <a:avLst/>
+            </a:prstGeom>
+          </p:spPr>
+        </p:pic>
+        <p:sp>
+          <p:nvSpPr>
+            <p:cNvPr id="22" name="Rectangle 21"/>
+            <p:cNvSpPr/>
+            <p:nvPr/>
+          </p:nvSpPr>
+          <p:spPr>
+            <a:xfrm>
+              <a:off x="3480775" y="2103592"/>
+              <a:ext cx="1832005" cy="1114169"/>
+            </a:xfrm>
+            <a:prstGeom prst="rect">
+              <a:avLst/>
+            </a:prstGeom>
+            <a:solidFill>
+              <a:schemeClr val="accent6">
+                <a:alpha val="30000"/>
+              </a:schemeClr>
+            </a:solidFill>
+            <a:ln>
+              <a:noFill/>
+            </a:ln>
+          </p:spPr>
+          <p:style>
+            <a:lnRef idx="2">
+              <a:schemeClr val="accent1">
+                <a:shade val="50000"/>
+              </a:schemeClr>
+            </a:lnRef>
+            <a:fillRef idx="1">
+              <a:schemeClr val="accent1"/>
+            </a:fillRef>
+            <a:effectRef idx="0">
+              <a:schemeClr val="accent1"/>
+            </a:effectRef>
+            <a:fontRef idx="minor">
+              <a:schemeClr val="lt1"/>
+            </a:fontRef>
+          </p:style>
+          <p:txBody>
+            <a:bodyPr rtlCol="0" anchor="ctr"/>
+            <a:lstStyle/>
+            <a:p>
+              <a:pPr algn="ctr"/>
+              <a:endParaRPr lang="en-US"/>
+            </a:p>
+          </p:txBody>
+        </p:sp>
+        <p:grpSp>
+          <p:nvGrpSpPr>
+            <p:cNvPr id="23" name="Group 22"/>
+            <p:cNvGrpSpPr/>
+            <p:nvPr/>
+          </p:nvGrpSpPr>
+          <p:grpSpPr>
+            <a:xfrm>
+              <a:off x="475638" y="1748335"/>
+              <a:ext cx="2312764" cy="1631216"/>
+              <a:chOff x="611578" y="2777425"/>
+              <a:chExt cx="2312764" cy="1631216"/>
+            </a:xfrm>
+          </p:grpSpPr>
+          <p:sp>
+            <p:nvSpPr>
+              <p:cNvPr id="25" name="TextBox 24"/>
+              <p:cNvSpPr txBox="1"/>
+              <p:nvPr/>
+            </p:nvSpPr>
+            <p:spPr>
+              <a:xfrm>
+                <a:off x="611578" y="2777425"/>
+                <a:ext cx="2312764" cy="1631216"/>
+              </a:xfrm>
+              <a:prstGeom prst="rect">
+                <a:avLst/>
+              </a:prstGeom>
+              <a:noFill/>
+            </p:spPr>
+            <p:txBody>
+              <a:bodyPr wrap="square" rtlCol="0">
+                <a:spAutoFit/>
+              </a:bodyPr>
+              <a:lstStyle/>
+              <a:p>
+                <a:r>
+                  <a:rPr lang="mr-IN" sz="1000" dirty="0" smtClean="0">
+                    <a:latin typeface="Courier New" charset="0"/>
+                    <a:ea typeface="Courier New" charset="0"/>
+                    <a:cs typeface="Courier New" charset="0"/>
+                  </a:rPr>
+                  <a:t>...</a:t>
+                </a:r>
+                <a:endParaRPr lang="en-US" sz="1000" dirty="0" smtClean="0">
+                  <a:latin typeface="Courier New" charset="0"/>
+                  <a:ea typeface="Courier New" charset="0"/>
+                  <a:cs typeface="Courier New" charset="0"/>
+                </a:endParaRPr>
+              </a:p>
+              <a:p>
+                <a:r>
+                  <a:rPr lang="en-US" sz="1000" dirty="0">
+                    <a:latin typeface="Courier New" charset="0"/>
+                    <a:ea typeface="Courier New" charset="0"/>
+                    <a:cs typeface="Courier New" charset="0"/>
+                  </a:rPr>
+                  <a:t> </a:t>
+                </a:r>
+                <a:r>
+                  <a:rPr lang="en-US" sz="1000" dirty="0" smtClean="0">
+                    <a:latin typeface="Courier New" charset="0"/>
+                    <a:ea typeface="Courier New" charset="0"/>
+                    <a:cs typeface="Courier New" charset="0"/>
+                  </a:rPr>
+                  <a:t> </a:t>
+                </a:r>
+                <a:r>
+                  <a:rPr lang="mr-IN" sz="1000" dirty="0" smtClean="0">
+                    <a:latin typeface="Courier New" charset="0"/>
+                    <a:ea typeface="Courier New" charset="0"/>
+                    <a:cs typeface="Courier New" charset="0"/>
+                  </a:rPr>
+                  <a:t>/</a:t>
+                </a:r>
+                <a:r>
+                  <a:rPr lang="mr-IN" sz="1000" dirty="0" err="1" smtClean="0">
+                    <a:latin typeface="Courier New" charset="0"/>
+                    <a:ea typeface="Courier New" charset="0"/>
+                    <a:cs typeface="Courier New" charset="0"/>
+                  </a:rPr>
+                  <a:t>users</a:t>
+                </a:r>
+                <a:r>
+                  <a:rPr lang="mr-IN" sz="1000" dirty="0" smtClean="0">
+                    <a:latin typeface="Courier New" charset="0"/>
+                    <a:ea typeface="Courier New" charset="0"/>
+                    <a:cs typeface="Courier New" charset="0"/>
+                  </a:rPr>
+                  <a:t>:</a:t>
+                </a:r>
+                <a:endParaRPr lang="en-US" sz="1000" dirty="0" smtClean="0">
+                  <a:latin typeface="Courier New" charset="0"/>
+                  <a:ea typeface="Courier New" charset="0"/>
+                  <a:cs typeface="Courier New" charset="0"/>
+                </a:endParaRPr>
+              </a:p>
+              <a:p>
+                <a:r>
+                  <a:rPr lang="en-US" sz="1000" dirty="0">
+                    <a:latin typeface="Courier New" charset="0"/>
+                    <a:ea typeface="Courier New" charset="0"/>
+                    <a:cs typeface="Courier New" charset="0"/>
+                  </a:rPr>
+                  <a:t> </a:t>
+                </a:r>
+                <a:r>
+                  <a:rPr lang="en-US" sz="1000" dirty="0" smtClean="0">
+                    <a:latin typeface="Courier New" charset="0"/>
+                    <a:ea typeface="Courier New" charset="0"/>
+                    <a:cs typeface="Courier New" charset="0"/>
+                  </a:rPr>
+                  <a:t>   post:</a:t>
+                </a:r>
+              </a:p>
+              <a:p>
+                <a:r>
+                  <a:rPr lang="en-US" sz="1000" dirty="0" smtClean="0">
+                    <a:latin typeface="Courier New" charset="0"/>
+                    <a:ea typeface="Courier New" charset="0"/>
+                    <a:cs typeface="Courier New" charset="0"/>
+                  </a:rPr>
+                  <a:t>  </a:t>
+                </a:r>
+                <a:r>
+                  <a:rPr lang="mr-IN" sz="1000" dirty="0" smtClean="0">
+                    <a:latin typeface="Courier New" charset="0"/>
+                    <a:ea typeface="Courier New" charset="0"/>
+                    <a:cs typeface="Courier New" charset="0"/>
+                  </a:rPr>
+                  <a:t>    </a:t>
+                </a:r>
+                <a:r>
+                  <a:rPr lang="en-US" sz="1000" dirty="0" err="1" smtClean="0">
+                    <a:latin typeface="Courier New" charset="0"/>
+                    <a:ea typeface="Courier New" charset="0"/>
+                    <a:cs typeface="Courier New" charset="0"/>
+                  </a:rPr>
+                  <a:t>requestBody</a:t>
+                </a:r>
+                <a:r>
+                  <a:rPr lang="en-US" sz="1000" dirty="0" smtClean="0">
+                    <a:latin typeface="Courier New" charset="0"/>
+                    <a:ea typeface="Courier New" charset="0"/>
+                    <a:cs typeface="Courier New" charset="0"/>
+                  </a:rPr>
+                  <a:t>:</a:t>
+                </a:r>
+              </a:p>
+              <a:p>
+                <a:r>
+                  <a:rPr lang="en-US" sz="1000" dirty="0" smtClean="0">
+                    <a:latin typeface="Courier New" charset="0"/>
+                    <a:ea typeface="Courier New" charset="0"/>
+                    <a:cs typeface="Courier New" charset="0"/>
+                  </a:rPr>
+                  <a:t>        application/</a:t>
+                </a:r>
+                <a:r>
+                  <a:rPr lang="en-US" sz="1000" dirty="0" err="1" smtClean="0">
+                    <a:latin typeface="Courier New" charset="0"/>
+                    <a:ea typeface="Courier New" charset="0"/>
+                    <a:cs typeface="Courier New" charset="0"/>
+                  </a:rPr>
+                  <a:t>json</a:t>
+                </a:r>
+                <a:endParaRPr lang="en-US" sz="1000" dirty="0" smtClean="0">
+                  <a:latin typeface="Courier New" charset="0"/>
+                  <a:ea typeface="Courier New" charset="0"/>
+                  <a:cs typeface="Courier New" charset="0"/>
+                </a:endParaRPr>
+              </a:p>
+              <a:p>
+                <a:r>
+                  <a:rPr lang="en-US" sz="1000" dirty="0">
+                    <a:latin typeface="Courier New" charset="0"/>
+                    <a:ea typeface="Courier New" charset="0"/>
+                    <a:cs typeface="Courier New" charset="0"/>
+                  </a:rPr>
+                  <a:t> </a:t>
+                </a:r>
+                <a:r>
+                  <a:rPr lang="en-US" sz="1000" dirty="0" smtClean="0">
+                    <a:latin typeface="Courier New" charset="0"/>
+                    <a:ea typeface="Courier New" charset="0"/>
+                    <a:cs typeface="Courier New" charset="0"/>
+                  </a:rPr>
+                  <a:t>         content</a:t>
+                </a:r>
+              </a:p>
+              <a:p>
+                <a:r>
+                  <a:rPr lang="en-US" sz="1000" dirty="0">
+                    <a:latin typeface="Courier New" charset="0"/>
+                    <a:ea typeface="Courier New" charset="0"/>
+                    <a:cs typeface="Courier New" charset="0"/>
+                  </a:rPr>
+                  <a:t> </a:t>
+                </a:r>
+                <a:r>
+                  <a:rPr lang="en-US" sz="1000" dirty="0" smtClean="0">
+                    <a:latin typeface="Courier New" charset="0"/>
+                    <a:ea typeface="Courier New" charset="0"/>
+                    <a:cs typeface="Courier New" charset="0"/>
+                  </a:rPr>
+                  <a:t>           schema</a:t>
+                </a:r>
+              </a:p>
+              <a:p>
+                <a:r>
+                  <a:rPr lang="en-US" sz="1000" dirty="0">
+                    <a:latin typeface="Courier New" charset="0"/>
+                    <a:ea typeface="Courier New" charset="0"/>
+                    <a:cs typeface="Courier New" charset="0"/>
+                  </a:rPr>
+                  <a:t> </a:t>
+                </a:r>
+                <a:r>
+                  <a:rPr lang="en-US" sz="1000" dirty="0" smtClean="0">
+                    <a:latin typeface="Courier New" charset="0"/>
+                    <a:ea typeface="Courier New" charset="0"/>
+                    <a:cs typeface="Courier New" charset="0"/>
+                  </a:rPr>
+                  <a:t>             $ref: user</a:t>
+                </a:r>
+              </a:p>
+              <a:p>
+                <a:endParaRPr lang="en-US" sz="1000" dirty="0">
+                  <a:latin typeface="Courier New" charset="0"/>
+                  <a:ea typeface="Courier New" charset="0"/>
+                  <a:cs typeface="Courier New" charset="0"/>
+                </a:endParaRPr>
+              </a:p>
+              <a:p>
+                <a:r>
+                  <a:rPr lang="mr-IN" sz="1000" dirty="0" smtClean="0">
+                    <a:latin typeface="Courier New" charset="0"/>
+                    <a:ea typeface="Courier New" charset="0"/>
+                    <a:cs typeface="Courier New" charset="0"/>
+                  </a:rPr>
+                  <a:t>...</a:t>
+                </a:r>
+                <a:endParaRPr lang="en-US" sz="1000" dirty="0">
+                  <a:latin typeface="Courier New" charset="0"/>
+                  <a:ea typeface="Courier New" charset="0"/>
+                  <a:cs typeface="Courier New" charset="0"/>
+                </a:endParaRPr>
+              </a:p>
+            </p:txBody>
+          </p:sp>
+          <p:sp>
+            <p:nvSpPr>
+              <p:cNvPr id="26" name="Rectangle 25"/>
+              <p:cNvSpPr/>
+              <p:nvPr/>
+            </p:nvSpPr>
+            <p:spPr>
+              <a:xfrm>
+                <a:off x="985773" y="3147596"/>
+                <a:ext cx="1589635" cy="932983"/>
+              </a:xfrm>
+              <a:prstGeom prst="rect">
+                <a:avLst/>
+              </a:prstGeom>
+              <a:solidFill>
+                <a:schemeClr val="accent6">
+                  <a:alpha val="30000"/>
+                </a:schemeClr>
+              </a:solidFill>
+              <a:ln>
+                <a:noFill/>
+              </a:ln>
+            </p:spPr>
+            <p:style>
+              <a:lnRef idx="2">
+                <a:schemeClr val="accent1">
+                  <a:shade val="50000"/>
+                </a:schemeClr>
+              </a:lnRef>
+              <a:fillRef idx="1">
+                <a:schemeClr val="accent1"/>
+              </a:fillRef>
+              <a:effectRef idx="0">
+                <a:schemeClr val="accent1"/>
+              </a:effectRef>
+              <a:fontRef idx="minor">
+                <a:schemeClr val="lt1"/>
+              </a:fontRef>
+            </p:style>
+            <p:txBody>
+              <a:bodyPr rtlCol="0" anchor="ctr"/>
+              <a:lstStyle/>
+              <a:p>
+                <a:pPr algn="ctr"/>
+                <a:endParaRPr lang="en-US"/>
+              </a:p>
+            </p:txBody>
+          </p:sp>
+        </p:grpSp>
+        <p:cxnSp>
+          <p:nvCxnSpPr>
+            <p:cNvPr id="24" name="Curved Connector 23"/>
+            <p:cNvCxnSpPr>
+              <a:stCxn id="26" idx="3"/>
+              <a:endCxn id="22" idx="1"/>
+            </p:cNvCxnSpPr>
+            <p:nvPr/>
+          </p:nvCxnSpPr>
+          <p:spPr>
+            <a:xfrm>
+              <a:off x="2439468" y="2584998"/>
+              <a:ext cx="1041307" cy="75679"/>
+            </a:xfrm>
+            <a:prstGeom prst="curvedConnector3">
+              <a:avLst/>
+            </a:prstGeom>
+            <a:ln w="19050">
+              <a:solidFill>
+                <a:schemeClr val="accent6"/>
+              </a:solidFill>
+              <a:tailEnd type="triangle"/>
+            </a:ln>
+          </p:spPr>
+          <p:style>
+            <a:lnRef idx="1">
+              <a:schemeClr val="accent1"/>
+            </a:lnRef>
+            <a:fillRef idx="0">
+              <a:schemeClr val="accent1"/>
+            </a:fillRef>
+            <a:effectRef idx="0">
+              <a:schemeClr val="accent1"/>
+            </a:effectRef>
+            <a:fontRef idx="minor">
+              <a:schemeClr val="tx1"/>
+            </a:fontRef>
+          </p:style>
+        </p:cxnSp>
+      </p:grpSp>
+      <p:grpSp>
+        <p:nvGrpSpPr>
+          <p:cNvPr id="74" name="Group 73"/>
+          <p:cNvGrpSpPr/>
+          <p:nvPr/>
+        </p:nvGrpSpPr>
+        <p:grpSpPr>
+          <a:xfrm>
+            <a:off x="274320" y="3119723"/>
+            <a:ext cx="4837142" cy="1612771"/>
+            <a:chOff x="274320" y="3119723"/>
+            <a:chExt cx="4837142" cy="1612771"/>
+          </a:xfrm>
+        </p:grpSpPr>
+        <p:sp>
+          <p:nvSpPr>
+            <p:cNvPr id="28" name="Rectangle 27"/>
+            <p:cNvSpPr/>
+            <p:nvPr/>
+          </p:nvSpPr>
+          <p:spPr>
+            <a:xfrm>
+              <a:off x="3631301" y="3470553"/>
+              <a:ext cx="1480161" cy="946542"/>
+            </a:xfrm>
+            <a:prstGeom prst="rect">
+              <a:avLst/>
+            </a:prstGeom>
+            <a:solidFill>
+              <a:srgbClr val="FBE5D6"/>
+            </a:solidFill>
+            <a:ln>
+              <a:noFill/>
+            </a:ln>
+          </p:spPr>
+          <p:style>
+            <a:lnRef idx="2">
+              <a:schemeClr val="accent1">
+                <a:shade val="50000"/>
+              </a:schemeClr>
+            </a:lnRef>
+            <a:fillRef idx="1">
+              <a:schemeClr val="accent1"/>
+            </a:fillRef>
+            <a:effectRef idx="0">
+              <a:schemeClr val="accent1"/>
+            </a:effectRef>
+            <a:fontRef idx="minor">
+              <a:schemeClr val="lt1"/>
+            </a:fontRef>
+          </p:style>
+          <p:txBody>
+            <a:bodyPr rtlCol="0" anchor="t"/>
+            <a:lstStyle/>
+            <a:p>
+              <a:pPr algn="ctr"/>
+              <a:r>
+                <a:rPr lang="en-US" sz="1200" b="1" smtClean="0">
+                  <a:solidFill>
+                    <a:schemeClr val="tx1"/>
+                  </a:solidFill>
+                </a:rPr>
+                <a:t>API</a:t>
+              </a:r>
+              <a:endParaRPr lang="en-US" sz="1200" b="1">
+                <a:solidFill>
+                  <a:schemeClr val="tx1"/>
+                </a:solidFill>
+              </a:endParaRPr>
+            </a:p>
+          </p:txBody>
+        </p:sp>
+        <p:pic>
+          <p:nvPicPr>
+            <p:cNvPr id="40" name="Picture 39"/>
+            <p:cNvPicPr>
+              <a:picLocks noChangeAspect="1"/>
+            </p:cNvPicPr>
+            <p:nvPr/>
+          </p:nvPicPr>
+          <p:blipFill>
+            <a:blip r:embed="rId4"/>
+            <a:stretch>
+              <a:fillRect/>
+            </a:stretch>
+          </p:blipFill>
+          <p:spPr>
+            <a:xfrm>
+              <a:off x="274320" y="3119723"/>
+              <a:ext cx="2351061" cy="1612771"/>
+            </a:xfrm>
+            <a:prstGeom prst="rect">
+              <a:avLst/>
+            </a:prstGeom>
+          </p:spPr>
+        </p:pic>
+        <p:sp>
+          <p:nvSpPr>
+            <p:cNvPr id="41" name="TextBox 40"/>
+            <p:cNvSpPr txBox="1"/>
+            <p:nvPr/>
+          </p:nvSpPr>
+          <p:spPr>
+            <a:xfrm>
+              <a:off x="3586551" y="3721355"/>
+              <a:ext cx="1521307" cy="365760"/>
+            </a:xfrm>
+            <a:prstGeom prst="rect">
+              <a:avLst/>
+            </a:prstGeom>
+            <a:noFill/>
+          </p:spPr>
+          <p:txBody>
+            <a:bodyPr wrap="square" rtlCol="0">
+              <a:noAutofit/>
+            </a:bodyPr>
+            <a:lstStyle/>
+            <a:p>
+              <a:r>
+                <a:rPr lang="en-US" sz="1000" dirty="0" smtClean="0">
+                  <a:latin typeface="Courier New" charset="0"/>
+                  <a:ea typeface="Courier New" charset="0"/>
+                  <a:cs typeface="Courier New" charset="0"/>
+                </a:rPr>
+                <a:t>GET /users/</a:t>
+              </a:r>
+              <a:r>
+                <a:rPr lang="en-US" sz="1000" dirty="0" err="1" smtClean="0">
+                  <a:latin typeface="Courier New" charset="0"/>
+                  <a:ea typeface="Courier New" charset="0"/>
+                  <a:cs typeface="Courier New" charset="0"/>
+                </a:rPr>
+                <a:t>erik</a:t>
+              </a:r>
+              <a:endParaRPr lang="en-US" sz="1000" dirty="0">
+                <a:latin typeface="Courier New" charset="0"/>
+                <a:ea typeface="Courier New" charset="0"/>
+                <a:cs typeface="Courier New" charset="0"/>
+              </a:endParaRPr>
+            </a:p>
+          </p:txBody>
+        </p:sp>
+        <p:sp>
+          <p:nvSpPr>
+            <p:cNvPr id="29" name="Rectangle 28"/>
+            <p:cNvSpPr/>
+            <p:nvPr/>
+          </p:nvSpPr>
+          <p:spPr>
+            <a:xfrm>
+              <a:off x="3586551" y="4149239"/>
+              <a:ext cx="1521307" cy="365760"/>
+            </a:xfrm>
+            <a:prstGeom prst="rect">
+              <a:avLst/>
+            </a:prstGeom>
+          </p:spPr>
+          <p:txBody>
+            <a:bodyPr wrap="none">
+              <a:noAutofit/>
+            </a:bodyPr>
+            <a:lstStyle/>
+            <a:p>
+              <a:pPr lvl="0"/>
+              <a:r>
+                <a:rPr lang="en-US" sz="1000" dirty="0">
+                  <a:solidFill>
+                    <a:srgbClr val="212121"/>
+                  </a:solidFill>
+                  <a:latin typeface="Courier New" charset="0"/>
+                  <a:ea typeface="Courier New" charset="0"/>
+                  <a:cs typeface="Courier New" charset="0"/>
+                </a:rPr>
+                <a:t>GET /companies/</a:t>
+              </a:r>
+              <a:r>
+                <a:rPr lang="en-US" sz="1000" dirty="0" err="1">
+                  <a:solidFill>
+                    <a:srgbClr val="212121"/>
+                  </a:solidFill>
+                  <a:latin typeface="Courier New" charset="0"/>
+                  <a:ea typeface="Courier New" charset="0"/>
+                  <a:cs typeface="Courier New" charset="0"/>
+                </a:rPr>
+                <a:t>ibm</a:t>
+              </a:r>
+              <a:endParaRPr lang="en-US" sz="1000" dirty="0">
+                <a:solidFill>
+                  <a:srgbClr val="212121"/>
+                </a:solidFill>
+                <a:latin typeface="Courier New" charset="0"/>
+                <a:ea typeface="Courier New" charset="0"/>
+                <a:cs typeface="Courier New" charset="0"/>
+              </a:endParaRPr>
+            </a:p>
+          </p:txBody>
+        </p:sp>
+        <p:sp>
+          <p:nvSpPr>
+            <p:cNvPr id="45" name="Arc 44"/>
+            <p:cNvSpPr/>
+            <p:nvPr/>
+          </p:nvSpPr>
+          <p:spPr>
+            <a:xfrm rot="657798" flipH="1">
+              <a:off x="1847934" y="3793128"/>
+              <a:ext cx="3209174" cy="387467"/>
+            </a:xfrm>
+            <a:prstGeom prst="arc">
+              <a:avLst/>
+            </a:prstGeom>
+            <a:ln w="19050">
+              <a:solidFill>
+                <a:schemeClr val="accent6"/>
+              </a:solidFill>
+              <a:headEnd type="triangle"/>
+              <a:tailEnd type="none"/>
+            </a:ln>
+          </p:spPr>
+          <p:style>
+            <a:lnRef idx="1">
+              <a:schemeClr val="accent1"/>
+            </a:lnRef>
+            <a:fillRef idx="0">
+              <a:schemeClr val="accent1"/>
+            </a:fillRef>
+            <a:effectRef idx="0">
+              <a:schemeClr val="accent1"/>
+            </a:effectRef>
+            <a:fontRef idx="minor">
+              <a:schemeClr val="tx1"/>
+            </a:fontRef>
+          </p:style>
+          <p:txBody>
+            <a:bodyPr rtlCol="0" anchor="ctr"/>
+            <a:lstStyle/>
+            <a:p>
+              <a:pPr algn="ctr"/>
+              <a:endParaRPr lang="en-US"/>
+            </a:p>
+          </p:txBody>
+        </p:sp>
+        <p:cxnSp>
+          <p:nvCxnSpPr>
+            <p:cNvPr id="47" name="Straight Arrow Connector 46"/>
+            <p:cNvCxnSpPr>
+              <a:endCxn id="41" idx="1"/>
+            </p:cNvCxnSpPr>
+            <p:nvPr/>
+          </p:nvCxnSpPr>
+          <p:spPr>
+            <a:xfrm>
+              <a:off x="1840375" y="3898677"/>
+              <a:ext cx="1746176" cy="5558"/>
+            </a:xfrm>
+            <a:prstGeom prst="straightConnector1">
+              <a:avLst/>
+            </a:prstGeom>
+            <a:ln w="19050">
+              <a:solidFill>
+                <a:schemeClr val="accent6"/>
+              </a:solidFill>
+              <a:headEnd type="triangle"/>
+              <a:tailEnd type="none"/>
+            </a:ln>
+          </p:spPr>
+          <p:style>
+            <a:lnRef idx="1">
+              <a:schemeClr val="accent1"/>
+            </a:lnRef>
+            <a:fillRef idx="0">
+              <a:schemeClr val="accent1"/>
+            </a:fillRef>
+            <a:effectRef idx="0">
+              <a:schemeClr val="accent1"/>
+            </a:effectRef>
+            <a:fontRef idx="minor">
+              <a:schemeClr val="tx1"/>
+            </a:fontRef>
+          </p:style>
+        </p:cxnSp>
+        <p:cxnSp>
+          <p:nvCxnSpPr>
+            <p:cNvPr id="55" name="Straight Arrow Connector 54"/>
+            <p:cNvCxnSpPr/>
+            <p:nvPr/>
+          </p:nvCxnSpPr>
+          <p:spPr>
+            <a:xfrm flipH="1" flipV="1">
+              <a:off x="1795627" y="4048984"/>
+              <a:ext cx="1790924" cy="181664"/>
+            </a:xfrm>
+            <a:prstGeom prst="straightConnector1">
+              <a:avLst/>
+            </a:prstGeom>
+            <a:ln w="19050">
+              <a:solidFill>
+                <a:schemeClr val="accent6"/>
+              </a:solidFill>
+              <a:headEnd type="triangle"/>
+              <a:tailEnd type="none"/>
+            </a:ln>
+          </p:spPr>
+          <p:style>
+            <a:lnRef idx="1">
+              <a:schemeClr val="accent1"/>
+            </a:lnRef>
+            <a:fillRef idx="0">
+              <a:schemeClr val="accent1"/>
+            </a:fillRef>
+            <a:effectRef idx="0">
+              <a:schemeClr val="accent1"/>
+            </a:effectRef>
+            <a:fontRef idx="minor">
+              <a:schemeClr val="tx1"/>
+            </a:fontRef>
+          </p:style>
+        </p:cxnSp>
+        <p:cxnSp>
+          <p:nvCxnSpPr>
+            <p:cNvPr id="60" name="Straight Arrow Connector 59"/>
+            <p:cNvCxnSpPr>
+              <a:endCxn id="29" idx="1"/>
+            </p:cNvCxnSpPr>
+            <p:nvPr/>
+          </p:nvCxnSpPr>
+          <p:spPr>
+            <a:xfrm>
+              <a:off x="1795627" y="4224863"/>
+              <a:ext cx="1790924" cy="107256"/>
+            </a:xfrm>
+            <a:prstGeom prst="straightConnector1">
+              <a:avLst/>
+            </a:prstGeom>
+            <a:ln w="19050">
+              <a:solidFill>
+                <a:schemeClr val="accent6"/>
+              </a:solidFill>
+              <a:headEnd type="triangle"/>
+              <a:tailEnd type="none"/>
+            </a:ln>
+          </p:spPr>
+          <p:style>
+            <a:lnRef idx="1">
+              <a:schemeClr val="accent1"/>
+            </a:lnRef>
+            <a:fillRef idx="0">
+              <a:schemeClr val="accent1"/>
+            </a:fillRef>
+            <a:effectRef idx="0">
+              <a:schemeClr val="accent1"/>
+            </a:effectRef>
+            <a:fontRef idx="minor">
+              <a:schemeClr val="tx1"/>
+            </a:fontRef>
+          </p:style>
+        </p:cxnSp>
+        <p:sp>
+          <p:nvSpPr>
+            <p:cNvPr id="68" name="Oval 67"/>
+            <p:cNvSpPr/>
+            <p:nvPr/>
+          </p:nvSpPr>
+          <p:spPr>
+            <a:xfrm>
+              <a:off x="2918029" y="3706979"/>
+              <a:ext cx="210312" cy="210312"/>
+            </a:xfrm>
+            <a:prstGeom prst="ellipse">
+              <a:avLst/>
+            </a:prstGeom>
+            <a:solidFill>
+              <a:schemeClr val="accent6"/>
+            </a:solidFill>
+            <a:ln>
+              <a:noFill/>
+            </a:ln>
+          </p:spPr>
+          <p:style>
+            <a:lnRef idx="2">
+              <a:schemeClr val="accent1">
+                <a:shade val="50000"/>
+              </a:schemeClr>
+            </a:lnRef>
+            <a:fillRef idx="1">
+              <a:schemeClr val="accent1"/>
+            </a:fillRef>
+            <a:effectRef idx="0">
+              <a:schemeClr val="accent1"/>
+            </a:effectRef>
+            <a:fontRef idx="minor">
+              <a:schemeClr val="lt1"/>
+            </a:fontRef>
+          </p:style>
+          <p:txBody>
+            <a:bodyPr rtlCol="0" anchor="ctr"/>
+            <a:lstStyle/>
+            <a:p>
+              <a:pPr algn="ctr"/>
+              <a:r>
+                <a:rPr lang="en-US" sz="1400" b="1" dirty="0" smtClean="0">
+                  <a:solidFill>
+                    <a:schemeClr val="bg2"/>
+                  </a:solidFill>
+                </a:rPr>
+                <a:t>1</a:t>
+              </a:r>
+              <a:endParaRPr lang="en-US" sz="1400" b="1" dirty="0">
+                <a:solidFill>
+                  <a:schemeClr val="bg2"/>
+                </a:solidFill>
+              </a:endParaRPr>
+            </a:p>
+          </p:txBody>
+        </p:sp>
+        <p:sp>
+          <p:nvSpPr>
+            <p:cNvPr id="69" name="Oval 68"/>
+            <p:cNvSpPr/>
+            <p:nvPr/>
+          </p:nvSpPr>
+          <p:spPr>
+            <a:xfrm>
+              <a:off x="2919142" y="4124689"/>
+              <a:ext cx="210312" cy="210312"/>
+            </a:xfrm>
+            <a:prstGeom prst="ellipse">
+              <a:avLst/>
+            </a:prstGeom>
+            <a:solidFill>
+              <a:schemeClr val="accent6"/>
+            </a:solidFill>
+            <a:ln>
+              <a:noFill/>
+            </a:ln>
+          </p:spPr>
+          <p:style>
+            <a:lnRef idx="2">
+              <a:schemeClr val="accent1">
+                <a:shade val="50000"/>
+              </a:schemeClr>
+            </a:lnRef>
+            <a:fillRef idx="1">
+              <a:schemeClr val="accent1"/>
+            </a:fillRef>
+            <a:effectRef idx="0">
+              <a:schemeClr val="accent1"/>
+            </a:effectRef>
+            <a:fontRef idx="minor">
+              <a:schemeClr val="lt1"/>
+            </a:fontRef>
+          </p:style>
+          <p:txBody>
+            <a:bodyPr rtlCol="0" anchor="ctr"/>
+            <a:lstStyle/>
+            <a:p>
+              <a:pPr algn="ctr"/>
+              <a:r>
+                <a:rPr lang="en-US" sz="1400" b="1" dirty="0" smtClean="0">
+                  <a:solidFill>
+                    <a:schemeClr val="bg2"/>
+                  </a:solidFill>
+                </a:rPr>
+                <a:t>2</a:t>
+              </a:r>
+              <a:endParaRPr lang="en-US" sz="1400" b="1" dirty="0">
+                <a:solidFill>
+                  <a:schemeClr val="bg2"/>
+                </a:solidFill>
+              </a:endParaRPr>
+            </a:p>
+          </p:txBody>
+        </p:sp>
+      </p:grpSp>
+    </p:spTree>
+    <p:extLst>
+      <p:ext uri="{BB962C8B-B14F-4D97-AF65-F5344CB8AC3E}">
+        <p14:creationId xmlns:p14="http://schemas.microsoft.com/office/powerpoint/2010/main" val="1014678993"/>
+      </p:ext>
+    </p:extLst>
+  </p:cSld>
+  <p:clrMapOvr>
+    <a:masterClrMapping/>
+  </p:clrMapOvr>
+  <p:timing>
+    <p:tnLst>
+      <p:par>
+        <p:cTn id="1" dur="indefinite" restart="never" nodeType="tmRoot"/>
+      </p:par>
+    </p:tnLst>
+  </p:timing>
+</p:sld>
+</file>
+
+<file path=ppt/slides/slide7.xml><?xml version="1.0" encoding="utf-8"?>
+<p:sld xmlns:a="http://schemas.openxmlformats.org/drawingml/2006/main" xmlns:r="http://schemas.openxmlformats.org/officeDocument/2006/relationships" xmlns:p="http://schemas.openxmlformats.org/presentationml/2006/main">
+  <p:cSld>
+    <p:spTree>
+      <p:nvGrpSpPr>
+        <p:cNvPr id="1" name=""/>
+        <p:cNvGrpSpPr/>
+        <p:nvPr/>
+      </p:nvGrpSpPr>
+      <p:grpSpPr>
+        <a:xfrm>
+          <a:off x="0" y="0"/>
+          <a:ext cx="0" cy="0"/>
+          <a:chOff x="0" y="0"/>
+          <a:chExt cx="0" cy="0"/>
+        </a:xfrm>
+      </p:grpSpPr>
     </p:spTree>
     <p:extLst>
       <p:ext uri="{BB962C8B-B14F-4D97-AF65-F5344CB8AC3E}">

</xml_diff>

<commit_message>
added authentication to documentation
</commit_message>
<xml_diff>
--- a/docs/oasgraph.pptx
+++ b/docs/oasgraph.pptx
@@ -5,7 +5,7 @@
     <p:sldMasterId id="2147483648" r:id="rId1"/>
   </p:sldMasterIdLst>
   <p:notesMasterIdLst>
-    <p:notesMasterId r:id="rId9"/>
+    <p:notesMasterId r:id="rId10"/>
   </p:notesMasterIdLst>
   <p:sldIdLst>
     <p:sldId id="256" r:id="rId2"/>
@@ -14,7 +14,8 @@
     <p:sldId id="260" r:id="rId5"/>
     <p:sldId id="261" r:id="rId6"/>
     <p:sldId id="262" r:id="rId7"/>
-    <p:sldId id="258" r:id="rId8"/>
+    <p:sldId id="263" r:id="rId8"/>
+    <p:sldId id="258" r:id="rId9"/>
   </p:sldIdLst>
   <p:sldSz cx="9144000" cy="5143500" type="screen16x9"/>
   <p:notesSz cx="6858000" cy="9144000"/>
@@ -273,7 +274,7 @@
               <a:pPr>
                 <a:defRPr/>
               </a:pPr>
-              <a:t>6/14/17</a:t>
+              <a:t>6/19/17</a:t>
             </a:fld>
             <a:endParaRPr lang="en-US" dirty="0"/>
           </a:p>
@@ -15467,6 +15468,753 @@
           <a:chExt cx="0" cy="0"/>
         </a:xfrm>
       </p:grpSpPr>
+      <p:pic>
+        <p:nvPicPr>
+          <p:cNvPr id="6" name="Picture 5"/>
+          <p:cNvPicPr>
+            <a:picLocks noChangeAspect="1"/>
+          </p:cNvPicPr>
+          <p:nvPr/>
+        </p:nvPicPr>
+        <p:blipFill>
+          <a:blip r:embed="rId2"/>
+          <a:stretch>
+            <a:fillRect/>
+          </a:stretch>
+        </p:blipFill>
+        <p:spPr>
+          <a:xfrm>
+            <a:off x="286253" y="3093688"/>
+            <a:ext cx="2349500" cy="1219200"/>
+          </a:xfrm>
+          <a:prstGeom prst="rect">
+            <a:avLst/>
+          </a:prstGeom>
+        </p:spPr>
+      </p:pic>
+      <p:sp>
+        <p:nvSpPr>
+          <p:cNvPr id="2" name="Title 1"/>
+          <p:cNvSpPr>
+            <a:spLocks noGrp="1"/>
+          </p:cNvSpPr>
+          <p:nvPr>
+            <p:ph type="title"/>
+          </p:nvPr>
+        </p:nvSpPr>
+        <p:spPr/>
+        <p:txBody>
+          <a:bodyPr/>
+          <a:lstStyle/>
+          <a:p>
+            <a:r>
+              <a:rPr lang="en-US" dirty="0" smtClean="0"/>
+              <a:t>Images </a:t>
+            </a:r>
+            <a:r>
+              <a:rPr lang="en-US" dirty="0" smtClean="0"/>
+              <a:t>3</a:t>
+            </a:r>
+            <a:endParaRPr lang="en-US" dirty="0"/>
+          </a:p>
+        </p:txBody>
+      </p:sp>
+      <p:grpSp>
+        <p:nvGrpSpPr>
+          <p:cNvPr id="27" name="Group 26"/>
+          <p:cNvGrpSpPr/>
+          <p:nvPr/>
+        </p:nvGrpSpPr>
+        <p:grpSpPr>
+          <a:xfrm>
+            <a:off x="274320" y="754328"/>
+            <a:ext cx="4960987" cy="2113574"/>
+            <a:chOff x="475638" y="1506683"/>
+            <a:chExt cx="4960987" cy="2113574"/>
+          </a:xfrm>
+        </p:grpSpPr>
+        <p:pic>
+          <p:nvPicPr>
+            <p:cNvPr id="3" name="Picture 2"/>
+            <p:cNvPicPr>
+              <a:picLocks noChangeAspect="1"/>
+            </p:cNvPicPr>
+            <p:nvPr/>
+          </p:nvPicPr>
+          <p:blipFill>
+            <a:blip r:embed="rId3"/>
+            <a:stretch>
+              <a:fillRect/>
+            </a:stretch>
+          </p:blipFill>
+          <p:spPr>
+            <a:xfrm>
+              <a:off x="3086617" y="1506683"/>
+              <a:ext cx="2350008" cy="2113574"/>
+            </a:xfrm>
+            <a:prstGeom prst="rect">
+              <a:avLst/>
+            </a:prstGeom>
+          </p:spPr>
+        </p:pic>
+        <p:pic>
+          <p:nvPicPr>
+            <p:cNvPr id="20" name="Picture 19"/>
+            <p:cNvPicPr>
+              <a:picLocks noChangeAspect="1"/>
+            </p:cNvPicPr>
+            <p:nvPr/>
+          </p:nvPicPr>
+          <p:blipFill>
+            <a:blip r:embed="rId4">
+              <a:extLst>
+                <a:ext uri="{28A0092B-C50C-407E-A947-70E740481C1C}">
+                  <a14:useLocalDpi xmlns:a14="http://schemas.microsoft.com/office/drawing/2010/main" val="0"/>
+                </a:ext>
+              </a:extLst>
+            </a:blip>
+            <a:stretch>
+              <a:fillRect/>
+            </a:stretch>
+          </p:blipFill>
+          <p:spPr>
+            <a:xfrm>
+              <a:off x="498788" y="1508657"/>
+              <a:ext cx="284388" cy="284388"/>
+            </a:xfrm>
+            <a:prstGeom prst="rect">
+              <a:avLst/>
+            </a:prstGeom>
+          </p:spPr>
+        </p:pic>
+        <p:sp>
+          <p:nvSpPr>
+            <p:cNvPr id="22" name="Rectangle 21"/>
+            <p:cNvSpPr/>
+            <p:nvPr/>
+          </p:nvSpPr>
+          <p:spPr>
+            <a:xfrm>
+              <a:off x="3480775" y="2103592"/>
+              <a:ext cx="1832005" cy="1114169"/>
+            </a:xfrm>
+            <a:prstGeom prst="rect">
+              <a:avLst/>
+            </a:prstGeom>
+            <a:solidFill>
+              <a:schemeClr val="accent6">
+                <a:alpha val="30000"/>
+              </a:schemeClr>
+            </a:solidFill>
+            <a:ln>
+              <a:noFill/>
+            </a:ln>
+          </p:spPr>
+          <p:style>
+            <a:lnRef idx="2">
+              <a:schemeClr val="accent1">
+                <a:shade val="50000"/>
+              </a:schemeClr>
+            </a:lnRef>
+            <a:fillRef idx="1">
+              <a:schemeClr val="accent1"/>
+            </a:fillRef>
+            <a:effectRef idx="0">
+              <a:schemeClr val="accent1"/>
+            </a:effectRef>
+            <a:fontRef idx="minor">
+              <a:schemeClr val="lt1"/>
+            </a:fontRef>
+          </p:style>
+          <p:txBody>
+            <a:bodyPr rtlCol="0" anchor="ctr"/>
+            <a:lstStyle/>
+            <a:p>
+              <a:pPr algn="ctr"/>
+              <a:endParaRPr lang="en-US"/>
+            </a:p>
+          </p:txBody>
+        </p:sp>
+        <p:grpSp>
+          <p:nvGrpSpPr>
+            <p:cNvPr id="23" name="Group 22"/>
+            <p:cNvGrpSpPr/>
+            <p:nvPr/>
+          </p:nvGrpSpPr>
+          <p:grpSpPr>
+            <a:xfrm>
+              <a:off x="475638" y="1748335"/>
+              <a:ext cx="2312764" cy="1631216"/>
+              <a:chOff x="611578" y="2777425"/>
+              <a:chExt cx="2312764" cy="1631216"/>
+            </a:xfrm>
+          </p:grpSpPr>
+          <p:sp>
+            <p:nvSpPr>
+              <p:cNvPr id="25" name="TextBox 24"/>
+              <p:cNvSpPr txBox="1"/>
+              <p:nvPr/>
+            </p:nvSpPr>
+            <p:spPr>
+              <a:xfrm>
+                <a:off x="611578" y="2777425"/>
+                <a:ext cx="2312764" cy="1631216"/>
+              </a:xfrm>
+              <a:prstGeom prst="rect">
+                <a:avLst/>
+              </a:prstGeom>
+              <a:noFill/>
+            </p:spPr>
+            <p:txBody>
+              <a:bodyPr wrap="square" rtlCol="0">
+                <a:spAutoFit/>
+              </a:bodyPr>
+              <a:lstStyle/>
+              <a:p>
+                <a:r>
+                  <a:rPr lang="mr-IN" sz="1000" dirty="0" smtClean="0">
+                    <a:latin typeface="Courier New" charset="0"/>
+                    <a:ea typeface="Courier New" charset="0"/>
+                    <a:cs typeface="Courier New" charset="0"/>
+                  </a:rPr>
+                  <a:t>...</a:t>
+                </a:r>
+                <a:endParaRPr lang="en-US" sz="1000" dirty="0" smtClean="0">
+                  <a:latin typeface="Courier New" charset="0"/>
+                  <a:ea typeface="Courier New" charset="0"/>
+                  <a:cs typeface="Courier New" charset="0"/>
+                </a:endParaRPr>
+              </a:p>
+              <a:p>
+                <a:r>
+                  <a:rPr lang="en-US" sz="1000" dirty="0">
+                    <a:latin typeface="Courier New" charset="0"/>
+                    <a:ea typeface="Courier New" charset="0"/>
+                    <a:cs typeface="Courier New" charset="0"/>
+                  </a:rPr>
+                  <a:t> </a:t>
+                </a:r>
+                <a:r>
+                  <a:rPr lang="en-US" sz="1000" dirty="0" smtClean="0">
+                    <a:latin typeface="Courier New" charset="0"/>
+                    <a:ea typeface="Courier New" charset="0"/>
+                    <a:cs typeface="Courier New" charset="0"/>
+                  </a:rPr>
+                  <a:t> </a:t>
+                </a:r>
+                <a:r>
+                  <a:rPr lang="mr-IN" sz="1000" dirty="0" smtClean="0">
+                    <a:latin typeface="Courier New" charset="0"/>
+                    <a:ea typeface="Courier New" charset="0"/>
+                    <a:cs typeface="Courier New" charset="0"/>
+                  </a:rPr>
+                  <a:t>/</a:t>
+                </a:r>
+                <a:r>
+                  <a:rPr lang="mr-IN" sz="1000" dirty="0" err="1" smtClean="0">
+                    <a:latin typeface="Courier New" charset="0"/>
+                    <a:ea typeface="Courier New" charset="0"/>
+                    <a:cs typeface="Courier New" charset="0"/>
+                  </a:rPr>
+                  <a:t>users</a:t>
+                </a:r>
+                <a:r>
+                  <a:rPr lang="mr-IN" sz="1000" dirty="0" smtClean="0">
+                    <a:latin typeface="Courier New" charset="0"/>
+                    <a:ea typeface="Courier New" charset="0"/>
+                    <a:cs typeface="Courier New" charset="0"/>
+                  </a:rPr>
+                  <a:t>:</a:t>
+                </a:r>
+                <a:endParaRPr lang="en-US" sz="1000" dirty="0" smtClean="0">
+                  <a:latin typeface="Courier New" charset="0"/>
+                  <a:ea typeface="Courier New" charset="0"/>
+                  <a:cs typeface="Courier New" charset="0"/>
+                </a:endParaRPr>
+              </a:p>
+              <a:p>
+                <a:r>
+                  <a:rPr lang="en-US" sz="1000" dirty="0">
+                    <a:latin typeface="Courier New" charset="0"/>
+                    <a:ea typeface="Courier New" charset="0"/>
+                    <a:cs typeface="Courier New" charset="0"/>
+                  </a:rPr>
+                  <a:t> </a:t>
+                </a:r>
+                <a:r>
+                  <a:rPr lang="en-US" sz="1000" dirty="0" smtClean="0">
+                    <a:latin typeface="Courier New" charset="0"/>
+                    <a:ea typeface="Courier New" charset="0"/>
+                    <a:cs typeface="Courier New" charset="0"/>
+                  </a:rPr>
+                  <a:t>   post:</a:t>
+                </a:r>
+              </a:p>
+              <a:p>
+                <a:r>
+                  <a:rPr lang="en-US" sz="1000" dirty="0" smtClean="0">
+                    <a:latin typeface="Courier New" charset="0"/>
+                    <a:ea typeface="Courier New" charset="0"/>
+                    <a:cs typeface="Courier New" charset="0"/>
+                  </a:rPr>
+                  <a:t>  </a:t>
+                </a:r>
+                <a:r>
+                  <a:rPr lang="mr-IN" sz="1000" dirty="0" smtClean="0">
+                    <a:latin typeface="Courier New" charset="0"/>
+                    <a:ea typeface="Courier New" charset="0"/>
+                    <a:cs typeface="Courier New" charset="0"/>
+                  </a:rPr>
+                  <a:t>    </a:t>
+                </a:r>
+                <a:r>
+                  <a:rPr lang="en-US" sz="1000" dirty="0" err="1" smtClean="0">
+                    <a:latin typeface="Courier New" charset="0"/>
+                    <a:ea typeface="Courier New" charset="0"/>
+                    <a:cs typeface="Courier New" charset="0"/>
+                  </a:rPr>
+                  <a:t>requestBody</a:t>
+                </a:r>
+                <a:r>
+                  <a:rPr lang="en-US" sz="1000" dirty="0" smtClean="0">
+                    <a:latin typeface="Courier New" charset="0"/>
+                    <a:ea typeface="Courier New" charset="0"/>
+                    <a:cs typeface="Courier New" charset="0"/>
+                  </a:rPr>
+                  <a:t>:</a:t>
+                </a:r>
+              </a:p>
+              <a:p>
+                <a:r>
+                  <a:rPr lang="en-US" sz="1000" dirty="0" smtClean="0">
+                    <a:latin typeface="Courier New" charset="0"/>
+                    <a:ea typeface="Courier New" charset="0"/>
+                    <a:cs typeface="Courier New" charset="0"/>
+                  </a:rPr>
+                  <a:t>        application/</a:t>
+                </a:r>
+                <a:r>
+                  <a:rPr lang="en-US" sz="1000" dirty="0" err="1" smtClean="0">
+                    <a:latin typeface="Courier New" charset="0"/>
+                    <a:ea typeface="Courier New" charset="0"/>
+                    <a:cs typeface="Courier New" charset="0"/>
+                  </a:rPr>
+                  <a:t>json</a:t>
+                </a:r>
+                <a:endParaRPr lang="en-US" sz="1000" dirty="0" smtClean="0">
+                  <a:latin typeface="Courier New" charset="0"/>
+                  <a:ea typeface="Courier New" charset="0"/>
+                  <a:cs typeface="Courier New" charset="0"/>
+                </a:endParaRPr>
+              </a:p>
+              <a:p>
+                <a:r>
+                  <a:rPr lang="en-US" sz="1000" dirty="0">
+                    <a:latin typeface="Courier New" charset="0"/>
+                    <a:ea typeface="Courier New" charset="0"/>
+                    <a:cs typeface="Courier New" charset="0"/>
+                  </a:rPr>
+                  <a:t> </a:t>
+                </a:r>
+                <a:r>
+                  <a:rPr lang="en-US" sz="1000" dirty="0" smtClean="0">
+                    <a:latin typeface="Courier New" charset="0"/>
+                    <a:ea typeface="Courier New" charset="0"/>
+                    <a:cs typeface="Courier New" charset="0"/>
+                  </a:rPr>
+                  <a:t>         content</a:t>
+                </a:r>
+              </a:p>
+              <a:p>
+                <a:r>
+                  <a:rPr lang="en-US" sz="1000" dirty="0">
+                    <a:latin typeface="Courier New" charset="0"/>
+                    <a:ea typeface="Courier New" charset="0"/>
+                    <a:cs typeface="Courier New" charset="0"/>
+                  </a:rPr>
+                  <a:t> </a:t>
+                </a:r>
+                <a:r>
+                  <a:rPr lang="en-US" sz="1000" dirty="0" smtClean="0">
+                    <a:latin typeface="Courier New" charset="0"/>
+                    <a:ea typeface="Courier New" charset="0"/>
+                    <a:cs typeface="Courier New" charset="0"/>
+                  </a:rPr>
+                  <a:t>           schema</a:t>
+                </a:r>
+              </a:p>
+              <a:p>
+                <a:r>
+                  <a:rPr lang="en-US" sz="1000" dirty="0">
+                    <a:latin typeface="Courier New" charset="0"/>
+                    <a:ea typeface="Courier New" charset="0"/>
+                    <a:cs typeface="Courier New" charset="0"/>
+                  </a:rPr>
+                  <a:t> </a:t>
+                </a:r>
+                <a:r>
+                  <a:rPr lang="en-US" sz="1000" dirty="0" smtClean="0">
+                    <a:latin typeface="Courier New" charset="0"/>
+                    <a:ea typeface="Courier New" charset="0"/>
+                    <a:cs typeface="Courier New" charset="0"/>
+                  </a:rPr>
+                  <a:t>             $ref: user</a:t>
+                </a:r>
+              </a:p>
+              <a:p>
+                <a:endParaRPr lang="en-US" sz="1000" dirty="0">
+                  <a:latin typeface="Courier New" charset="0"/>
+                  <a:ea typeface="Courier New" charset="0"/>
+                  <a:cs typeface="Courier New" charset="0"/>
+                </a:endParaRPr>
+              </a:p>
+              <a:p>
+                <a:r>
+                  <a:rPr lang="mr-IN" sz="1000" dirty="0" smtClean="0">
+                    <a:latin typeface="Courier New" charset="0"/>
+                    <a:ea typeface="Courier New" charset="0"/>
+                    <a:cs typeface="Courier New" charset="0"/>
+                  </a:rPr>
+                  <a:t>...</a:t>
+                </a:r>
+                <a:endParaRPr lang="en-US" sz="1000" dirty="0">
+                  <a:latin typeface="Courier New" charset="0"/>
+                  <a:ea typeface="Courier New" charset="0"/>
+                  <a:cs typeface="Courier New" charset="0"/>
+                </a:endParaRPr>
+              </a:p>
+            </p:txBody>
+          </p:sp>
+          <p:sp>
+            <p:nvSpPr>
+              <p:cNvPr id="26" name="Rectangle 25"/>
+              <p:cNvSpPr/>
+              <p:nvPr/>
+            </p:nvSpPr>
+            <p:spPr>
+              <a:xfrm>
+                <a:off x="985773" y="3147596"/>
+                <a:ext cx="1589635" cy="932983"/>
+              </a:xfrm>
+              <a:prstGeom prst="rect">
+                <a:avLst/>
+              </a:prstGeom>
+              <a:solidFill>
+                <a:schemeClr val="accent6">
+                  <a:alpha val="30000"/>
+                </a:schemeClr>
+              </a:solidFill>
+              <a:ln>
+                <a:noFill/>
+              </a:ln>
+            </p:spPr>
+            <p:style>
+              <a:lnRef idx="2">
+                <a:schemeClr val="accent1">
+                  <a:shade val="50000"/>
+                </a:schemeClr>
+              </a:lnRef>
+              <a:fillRef idx="1">
+                <a:schemeClr val="accent1"/>
+              </a:fillRef>
+              <a:effectRef idx="0">
+                <a:schemeClr val="accent1"/>
+              </a:effectRef>
+              <a:fontRef idx="minor">
+                <a:schemeClr val="lt1"/>
+              </a:fontRef>
+            </p:style>
+            <p:txBody>
+              <a:bodyPr rtlCol="0" anchor="ctr"/>
+              <a:lstStyle/>
+              <a:p>
+                <a:pPr algn="ctr"/>
+                <a:endParaRPr lang="en-US"/>
+              </a:p>
+            </p:txBody>
+          </p:sp>
+        </p:grpSp>
+        <p:cxnSp>
+          <p:nvCxnSpPr>
+            <p:cNvPr id="24" name="Curved Connector 23"/>
+            <p:cNvCxnSpPr>
+              <a:stCxn id="26" idx="3"/>
+              <a:endCxn id="22" idx="1"/>
+            </p:cNvCxnSpPr>
+            <p:nvPr/>
+          </p:nvCxnSpPr>
+          <p:spPr>
+            <a:xfrm>
+              <a:off x="2439468" y="2584998"/>
+              <a:ext cx="1041307" cy="75679"/>
+            </a:xfrm>
+            <a:prstGeom prst="curvedConnector3">
+              <a:avLst/>
+            </a:prstGeom>
+            <a:ln w="19050">
+              <a:solidFill>
+                <a:schemeClr val="accent6"/>
+              </a:solidFill>
+              <a:tailEnd type="triangle"/>
+            </a:ln>
+          </p:spPr>
+          <p:style>
+            <a:lnRef idx="1">
+              <a:schemeClr val="accent1"/>
+            </a:lnRef>
+            <a:fillRef idx="0">
+              <a:schemeClr val="accent1"/>
+            </a:fillRef>
+            <a:effectRef idx="0">
+              <a:schemeClr val="accent1"/>
+            </a:effectRef>
+            <a:fontRef idx="minor">
+              <a:schemeClr val="tx1"/>
+            </a:fontRef>
+          </p:style>
+        </p:cxnSp>
+      </p:grpSp>
+      <p:pic>
+        <p:nvPicPr>
+          <p:cNvPr id="5" name="Picture 4"/>
+          <p:cNvPicPr>
+            <a:picLocks noChangeAspect="1"/>
+          </p:cNvPicPr>
+          <p:nvPr/>
+        </p:nvPicPr>
+        <p:blipFill>
+          <a:blip r:embed="rId5"/>
+          <a:stretch>
+            <a:fillRect/>
+          </a:stretch>
+        </p:blipFill>
+        <p:spPr>
+          <a:xfrm>
+            <a:off x="2928518" y="3093688"/>
+            <a:ext cx="2329413" cy="1640717"/>
+          </a:xfrm>
+          <a:prstGeom prst="rect">
+            <a:avLst/>
+          </a:prstGeom>
+        </p:spPr>
+      </p:pic>
+      <p:sp>
+        <p:nvSpPr>
+          <p:cNvPr id="30" name="Rectangle 29"/>
+          <p:cNvSpPr/>
+          <p:nvPr/>
+        </p:nvSpPr>
+        <p:spPr>
+          <a:xfrm>
+            <a:off x="659550" y="3609903"/>
+            <a:ext cx="1839207" cy="146304"/>
+          </a:xfrm>
+          <a:prstGeom prst="rect">
+            <a:avLst/>
+          </a:prstGeom>
+          <a:solidFill>
+            <a:schemeClr val="accent6">
+              <a:alpha val="30000"/>
+            </a:schemeClr>
+          </a:solidFill>
+          <a:ln>
+            <a:noFill/>
+          </a:ln>
+        </p:spPr>
+        <p:style>
+          <a:lnRef idx="2">
+            <a:schemeClr val="accent1">
+              <a:shade val="50000"/>
+            </a:schemeClr>
+          </a:lnRef>
+          <a:fillRef idx="1">
+            <a:schemeClr val="accent1"/>
+          </a:fillRef>
+          <a:effectRef idx="0">
+            <a:schemeClr val="accent1"/>
+          </a:effectRef>
+          <a:fontRef idx="minor">
+            <a:schemeClr val="lt1"/>
+          </a:fontRef>
+        </p:style>
+        <p:txBody>
+          <a:bodyPr rtlCol="0" anchor="ctr"/>
+          <a:lstStyle/>
+          <a:p>
+            <a:pPr algn="ctr"/>
+            <a:endParaRPr lang="en-US"/>
+          </a:p>
+        </p:txBody>
+      </p:sp>
+      <p:sp>
+        <p:nvSpPr>
+          <p:cNvPr id="31" name="Rectangle 30"/>
+          <p:cNvSpPr/>
+          <p:nvPr/>
+        </p:nvSpPr>
+        <p:spPr>
+          <a:xfrm>
+            <a:off x="3275856" y="3646114"/>
+            <a:ext cx="1386680" cy="491319"/>
+          </a:xfrm>
+          <a:prstGeom prst="rect">
+            <a:avLst/>
+          </a:prstGeom>
+          <a:solidFill>
+            <a:schemeClr val="accent6">
+              <a:alpha val="30000"/>
+            </a:schemeClr>
+          </a:solidFill>
+          <a:ln>
+            <a:noFill/>
+          </a:ln>
+        </p:spPr>
+        <p:style>
+          <a:lnRef idx="2">
+            <a:schemeClr val="accent1">
+              <a:shade val="50000"/>
+            </a:schemeClr>
+          </a:lnRef>
+          <a:fillRef idx="1">
+            <a:schemeClr val="accent1"/>
+          </a:fillRef>
+          <a:effectRef idx="0">
+            <a:schemeClr val="accent1"/>
+          </a:effectRef>
+          <a:fontRef idx="minor">
+            <a:schemeClr val="lt1"/>
+          </a:fontRef>
+        </p:style>
+        <p:txBody>
+          <a:bodyPr rtlCol="0" anchor="ctr"/>
+          <a:lstStyle/>
+          <a:p>
+            <a:pPr algn="ctr"/>
+            <a:endParaRPr lang="en-US"/>
+          </a:p>
+        </p:txBody>
+      </p:sp>
+      <p:sp>
+        <p:nvSpPr>
+          <p:cNvPr id="7" name="TextBox 6"/>
+          <p:cNvSpPr txBox="1"/>
+          <p:nvPr/>
+        </p:nvSpPr>
+        <p:spPr>
+          <a:xfrm>
+            <a:off x="1846176" y="3369115"/>
+            <a:ext cx="740908" cy="276999"/>
+          </a:xfrm>
+          <a:prstGeom prst="rect">
+            <a:avLst/>
+          </a:prstGeom>
+          <a:noFill/>
+        </p:spPr>
+        <p:txBody>
+          <a:bodyPr wrap="none" rtlCol="0">
+            <a:spAutoFit/>
+          </a:bodyPr>
+          <a:lstStyle/>
+          <a:p>
+            <a:r>
+              <a:rPr lang="en-US" sz="1200" smtClean="0">
+                <a:solidFill>
+                  <a:schemeClr val="accent6"/>
+                </a:solidFill>
+              </a:rPr>
+              <a:t>API Key</a:t>
+            </a:r>
+            <a:endParaRPr lang="en-US" sz="1200" dirty="0">
+              <a:solidFill>
+                <a:schemeClr val="accent6"/>
+              </a:solidFill>
+            </a:endParaRPr>
+          </a:p>
+        </p:txBody>
+      </p:sp>
+      <p:sp>
+        <p:nvSpPr>
+          <p:cNvPr id="32" name="TextBox 31"/>
+          <p:cNvSpPr txBox="1"/>
+          <p:nvPr/>
+        </p:nvSpPr>
+        <p:spPr>
+          <a:xfrm>
+            <a:off x="3848872" y="3406056"/>
+            <a:ext cx="901209" cy="276999"/>
+          </a:xfrm>
+          <a:prstGeom prst="rect">
+            <a:avLst/>
+          </a:prstGeom>
+          <a:noFill/>
+        </p:spPr>
+        <p:txBody>
+          <a:bodyPr wrap="none" rtlCol="0">
+            <a:spAutoFit/>
+          </a:bodyPr>
+          <a:lstStyle/>
+          <a:p>
+            <a:r>
+              <a:rPr lang="en-US" sz="1200" dirty="0" smtClean="0">
+                <a:solidFill>
+                  <a:schemeClr val="accent6"/>
+                </a:solidFill>
+              </a:rPr>
+              <a:t>Basic </a:t>
+            </a:r>
+            <a:r>
+              <a:rPr lang="en-US" sz="1200" dirty="0" err="1" smtClean="0">
+                <a:solidFill>
+                  <a:schemeClr val="accent6"/>
+                </a:solidFill>
+              </a:rPr>
+              <a:t>auth</a:t>
+            </a:r>
+            <a:endParaRPr lang="en-US" sz="1200" dirty="0">
+              <a:solidFill>
+                <a:schemeClr val="accent6"/>
+              </a:solidFill>
+            </a:endParaRPr>
+          </a:p>
+        </p:txBody>
+      </p:sp>
+    </p:spTree>
+    <p:extLst>
+      <p:ext uri="{BB962C8B-B14F-4D97-AF65-F5344CB8AC3E}">
+        <p14:creationId xmlns:p14="http://schemas.microsoft.com/office/powerpoint/2010/main" val="1583546196"/>
+      </p:ext>
+    </p:extLst>
+  </p:cSld>
+  <p:clrMapOvr>
+    <a:masterClrMapping/>
+  </p:clrMapOvr>
+  <p:timing>
+    <p:tnLst>
+      <p:par>
+        <p:cTn id="1" dur="indefinite" restart="never" nodeType="tmRoot"/>
+      </p:par>
+    </p:tnLst>
+  </p:timing>
+</p:sld>
+</file>
+
+<file path=ppt/slides/slide8.xml><?xml version="1.0" encoding="utf-8"?>
+<p:sld xmlns:a="http://schemas.openxmlformats.org/drawingml/2006/main" xmlns:r="http://schemas.openxmlformats.org/officeDocument/2006/relationships" xmlns:p="http://schemas.openxmlformats.org/presentationml/2006/main">
+  <p:cSld>
+    <p:spTree>
+      <p:nvGrpSpPr>
+        <p:cNvPr id="1" name=""/>
+        <p:cNvGrpSpPr/>
+        <p:nvPr/>
+      </p:nvGrpSpPr>
+      <p:grpSpPr>
+        <a:xfrm>
+          <a:off x="0" y="0"/>
+          <a:ext cx="0" cy="0"/>
+          <a:chOff x="0" y="0"/>
+          <a:chExt cx="0" cy="0"/>
+        </a:xfrm>
+      </p:grpSpPr>
     </p:spTree>
     <p:extLst>
       <p:ext uri="{BB962C8B-B14F-4D97-AF65-F5344CB8AC3E}">

</xml_diff>

<commit_message>
revised documentation of authentication to address #32
</commit_message>
<xml_diff>
--- a/docs/oasgraph.pptx
+++ b/docs/oasgraph.pptx
@@ -274,7 +274,7 @@
               <a:pPr>
                 <a:defRPr/>
               </a:pPr>
-              <a:t>6/19/17</a:t>
+              <a:t>6/28/17</a:t>
             </a:fld>
             <a:endParaRPr lang="en-US" dirty="0"/>
           </a:p>
@@ -15485,11 +15485,7 @@
           <a:p>
             <a:r>
               <a:rPr lang="en-US" dirty="0" smtClean="0"/>
-              <a:t>Images </a:t>
-            </a:r>
-            <a:r>
-              <a:rPr lang="en-US" dirty="0" smtClean="0"/>
-              <a:t>3</a:t>
+              <a:t>Images 3</a:t>
             </a:r>
             <a:endParaRPr lang="en-US" dirty="0"/>
           </a:p>
@@ -15497,21 +15493,21 @@
       </p:sp>
       <p:grpSp>
         <p:nvGrpSpPr>
-          <p:cNvPr id="8" name="Group 7"/>
+          <p:cNvPr id="10" name="Group 9"/>
           <p:cNvGrpSpPr/>
           <p:nvPr/>
         </p:nvGrpSpPr>
         <p:grpSpPr>
           <a:xfrm>
-            <a:off x="274320" y="866535"/>
-            <a:ext cx="4971678" cy="1640717"/>
-            <a:chOff x="286253" y="3093688"/>
-            <a:chExt cx="4971678" cy="1640717"/>
+            <a:off x="274320" y="858556"/>
+            <a:ext cx="4971678" cy="1664866"/>
+            <a:chOff x="274320" y="858556"/>
+            <a:chExt cx="4971678" cy="1664866"/>
           </a:xfrm>
         </p:grpSpPr>
         <p:pic>
           <p:nvPicPr>
-            <p:cNvPr id="6" name="Picture 5"/>
+            <p:cNvPr id="4" name="Picture 3"/>
             <p:cNvPicPr>
               <a:picLocks noChangeAspect="1"/>
             </p:cNvPicPr>
@@ -15525,8 +15521,8 @@
           </p:blipFill>
           <p:spPr>
             <a:xfrm>
-              <a:off x="286253" y="3093688"/>
-              <a:ext cx="2349500" cy="1219200"/>
+              <a:off x="274320" y="858556"/>
+              <a:ext cx="2345916" cy="1218072"/>
             </a:xfrm>
             <a:prstGeom prst="rect">
               <a:avLst/>
@@ -15535,7 +15531,7 @@
         </p:pic>
         <p:pic>
           <p:nvPicPr>
-            <p:cNvPr id="5" name="Picture 4"/>
+            <p:cNvPr id="9" name="Picture 8"/>
             <p:cNvPicPr>
               <a:picLocks noChangeAspect="1"/>
             </p:cNvPicPr>
@@ -15549,8 +15545,8 @@
           </p:blipFill>
           <p:spPr>
             <a:xfrm>
-              <a:off x="2928518" y="3093688"/>
-              <a:ext cx="2329413" cy="1640717"/>
+              <a:off x="2916585" y="858556"/>
+              <a:ext cx="2329413" cy="1664866"/>
             </a:xfrm>
             <a:prstGeom prst="rect">
               <a:avLst/>
@@ -15565,7 +15561,7 @@
           </p:nvSpPr>
           <p:spPr>
             <a:xfrm>
-              <a:off x="659550" y="3609903"/>
+              <a:off x="630525" y="1382750"/>
               <a:ext cx="1839207" cy="146304"/>
             </a:xfrm>
             <a:prstGeom prst="rect">
@@ -15613,7 +15609,7 @@
           </p:nvSpPr>
           <p:spPr>
             <a:xfrm>
-              <a:off x="3275856" y="3646114"/>
+              <a:off x="3263923" y="1444599"/>
               <a:ext cx="1386680" cy="491319"/>
             </a:xfrm>
             <a:prstGeom prst="rect">
@@ -15661,7 +15657,7 @@
           </p:nvSpPr>
           <p:spPr>
             <a:xfrm>
-              <a:off x="1846176" y="3369115"/>
+              <a:off x="1817151" y="1141962"/>
               <a:ext cx="740908" cy="276999"/>
             </a:xfrm>
             <a:prstGeom prst="rect">
@@ -15676,7 +15672,7 @@
             <a:lstStyle/>
             <a:p>
               <a:r>
-                <a:rPr lang="en-US" sz="1200" smtClean="0">
+                <a:rPr lang="en-US" sz="1200" dirty="0" smtClean="0">
                   <a:solidFill>
                     <a:schemeClr val="accent6"/>
                   </a:solidFill>
@@ -15699,7 +15695,7 @@
           </p:nvSpPr>
           <p:spPr>
             <a:xfrm>
-              <a:off x="3848872" y="3406056"/>
+              <a:off x="3836939" y="1187449"/>
               <a:ext cx="901209" cy="276999"/>
             </a:xfrm>
             <a:prstGeom prst="rect">

</xml_diff>